<commit_message>
Update part 4 format
</commit_message>
<xml_diff>
--- a/lessons/part_4/production_4.pptx
+++ b/lessons/part_4/production_4.pptx
@@ -5,7 +5,7 @@
     <p:sldMasterId id="2147484296" r:id="rId1"/>
   </p:sldMasterIdLst>
   <p:notesMasterIdLst>
-    <p:notesMasterId r:id="rId29"/>
+    <p:notesMasterId r:id="rId30"/>
   </p:notesMasterIdLst>
   <p:sldIdLst>
     <p:sldId id="256" r:id="rId2"/>
@@ -35,6 +35,7 @@
     <p:sldId id="280" r:id="rId26"/>
     <p:sldId id="281" r:id="rId27"/>
     <p:sldId id="282" r:id="rId28"/>
+    <p:sldId id="283" r:id="rId29"/>
   </p:sldIdLst>
   <p:sldSz cx="12192000" cy="6858000"/>
   <p:notesSz cx="6858000" cy="9144000"/>
@@ -221,7 +222,7 @@
             </a:lvl1pPr>
           </a:lstStyle>
           <a:p>
-            <a:fld id="{F2E2C6E0-17EF-4053-8A31-4EFBE494E6B2}" type="datetimeFigureOut">
+            <a:fld id="{DBA84D58-564C-4AD0-B0DE-EC31E009B559}" type="datetimeFigureOut">
               <a:rPr lang="en-CA" smtClean="0"/>
               <a:t>2024-02-09</a:t>
             </a:fld>
@@ -380,7 +381,7 @@
             </a:lvl1pPr>
           </a:lstStyle>
           <a:p>
-            <a:fld id="{1E4EF279-A478-4262-907E-4F26DD9B4E11}" type="slidenum">
+            <a:fld id="{987706E9-A3FA-46CE-A5EC-1D97B76B3AB7}" type="slidenum">
               <a:rPr lang="en-CA" smtClean="0"/>
               <a:t>‹#›</a:t>
             </a:fld>
@@ -391,7 +392,7 @@
     </p:spTree>
     <p:extLst>
       <p:ext uri="{BB962C8B-B14F-4D97-AF65-F5344CB8AC3E}">
-        <p14:creationId xmlns:p14="http://schemas.microsoft.com/office/powerpoint/2010/main" val="2326327924"/>
+        <p14:creationId xmlns:p14="http://schemas.microsoft.com/office/powerpoint/2010/main" val="1778900820"/>
       </p:ext>
     </p:extLst>
   </p:cSld>
@@ -687,11 +688,10 @@
             </a:lvl1pPr>
           </a:lstStyle>
           <a:p>
-            <a:fld id="{B6F40D80-A8AB-45A7-913B-570A7801BA55}" type="datetime1">
-              <a:rPr lang="en-CA" smtClean="0"/>
-              <a:t>2024-02-09</a:t>
-            </a:fld>
-            <a:endParaRPr lang="en-CA"/>
+            <a:r>
+              <a:rPr lang="en-CA"/>
+              <a:t>February 2024</a:t>
+            </a:r>
           </a:p>
         </p:txBody>
       </p:sp>
@@ -880,11 +880,10 @@
           <a:bodyPr/>
           <a:lstStyle/>
           <a:p>
-            <a:fld id="{7D18D325-59C9-49D5-9076-FBB140D959E2}" type="datetime1">
-              <a:rPr lang="en-CA" smtClean="0"/>
-              <a:t>2024-02-09</a:t>
-            </a:fld>
-            <a:endParaRPr lang="en-CA"/>
+            <a:r>
+              <a:rPr lang="en-CA"/>
+              <a:t>February 2024</a:t>
+            </a:r>
           </a:p>
         </p:txBody>
       </p:sp>
@@ -1063,11 +1062,10 @@
           <a:bodyPr/>
           <a:lstStyle/>
           <a:p>
-            <a:fld id="{26F60133-DE57-471D-8486-8B20E6CFD722}" type="datetime1">
-              <a:rPr lang="en-CA" smtClean="0"/>
-              <a:t>2024-02-09</a:t>
-            </a:fld>
-            <a:endParaRPr lang="en-CA"/>
+            <a:r>
+              <a:rPr lang="en-CA"/>
+              <a:t>February 2024</a:t>
+            </a:r>
           </a:p>
         </p:txBody>
       </p:sp>
@@ -1236,11 +1234,10 @@
           <a:bodyPr/>
           <a:lstStyle/>
           <a:p>
-            <a:fld id="{F6B3EFCD-798F-4BD9-A3DA-4D18212730D0}" type="datetime1">
-              <a:rPr lang="en-CA" smtClean="0"/>
-              <a:t>2024-02-09</a:t>
-            </a:fld>
-            <a:endParaRPr lang="en-CA"/>
+            <a:r>
+              <a:rPr lang="en-CA"/>
+              <a:t>February 2024</a:t>
+            </a:r>
           </a:p>
         </p:txBody>
       </p:sp>
@@ -1495,11 +1492,10 @@
           <a:bodyPr/>
           <a:lstStyle/>
           <a:p>
-            <a:fld id="{1825B003-9B73-44DB-A8C3-D3A5CA80B13A}" type="datetime1">
-              <a:rPr lang="en-CA" smtClean="0"/>
-              <a:t>2024-02-09</a:t>
-            </a:fld>
-            <a:endParaRPr lang="en-CA"/>
+            <a:r>
+              <a:rPr lang="en-CA"/>
+              <a:t>February 2024</a:t>
+            </a:r>
           </a:p>
         </p:txBody>
       </p:sp>
@@ -1786,11 +1782,10 @@
           <a:bodyPr/>
           <a:lstStyle/>
           <a:p>
-            <a:fld id="{C6993023-DCEF-49C7-95C5-6B9B2C930777}" type="datetime1">
-              <a:rPr lang="en-CA" smtClean="0"/>
-              <a:t>2024-02-09</a:t>
-            </a:fld>
-            <a:endParaRPr lang="en-CA"/>
+            <a:r>
+              <a:rPr lang="en-CA"/>
+              <a:t>February 2024</a:t>
+            </a:r>
           </a:p>
         </p:txBody>
       </p:sp>
@@ -2227,11 +2222,10 @@
           <a:bodyPr/>
           <a:lstStyle/>
           <a:p>
-            <a:fld id="{F4544258-1C23-4CB5-B71B-3DCD882EFEAC}" type="datetime1">
-              <a:rPr lang="en-CA" smtClean="0"/>
-              <a:t>2024-02-09</a:t>
-            </a:fld>
-            <a:endParaRPr lang="en-CA"/>
+            <a:r>
+              <a:rPr lang="en-CA"/>
+              <a:t>February 2024</a:t>
+            </a:r>
           </a:p>
         </p:txBody>
       </p:sp>
@@ -2348,11 +2342,10 @@
           <a:bodyPr/>
           <a:lstStyle/>
           <a:p>
-            <a:fld id="{D107EB8D-4B82-4194-B569-B02E57922E56}" type="datetime1">
-              <a:rPr lang="en-CA" smtClean="0"/>
-              <a:t>2024-02-09</a:t>
-            </a:fld>
-            <a:endParaRPr lang="en-CA"/>
+            <a:r>
+              <a:rPr lang="en-CA"/>
+              <a:t>February 2024</a:t>
+            </a:r>
           </a:p>
         </p:txBody>
       </p:sp>
@@ -2446,11 +2439,10 @@
           <a:bodyPr/>
           <a:lstStyle/>
           <a:p>
-            <a:fld id="{06FB3FAD-9CBE-4C17-9D2C-E448EFDC489D}" type="datetime1">
-              <a:rPr lang="en-CA" smtClean="0"/>
-              <a:t>2024-02-09</a:t>
-            </a:fld>
-            <a:endParaRPr lang="en-CA"/>
+            <a:r>
+              <a:rPr lang="en-CA"/>
+              <a:t>February 2024</a:t>
+            </a:r>
           </a:p>
         </p:txBody>
       </p:sp>
@@ -2805,11 +2797,10 @@
           <a:bodyPr/>
           <a:lstStyle/>
           <a:p>
-            <a:fld id="{6512EFD7-17CF-41A2-B000-8F4F21023142}" type="datetime1">
-              <a:rPr lang="en-CA" smtClean="0"/>
-              <a:t>2024-02-09</a:t>
-            </a:fld>
-            <a:endParaRPr lang="en-CA"/>
+            <a:r>
+              <a:rPr lang="en-CA"/>
+              <a:t>February 2024</a:t>
+            </a:r>
           </a:p>
         </p:txBody>
       </p:sp>
@@ -3124,11 +3115,10 @@
             </a:lvl1pPr>
           </a:lstStyle>
           <a:p>
-            <a:fld id="{00FF41BC-6039-44E6-A4DE-BD8543CA8E09}" type="datetime1">
-              <a:rPr lang="en-CA" smtClean="0"/>
-              <a:t>2024-02-09</a:t>
-            </a:fld>
-            <a:endParaRPr lang="en-CA"/>
+            <a:r>
+              <a:rPr lang="en-CA"/>
+              <a:t>February 2024</a:t>
+            </a:r>
           </a:p>
         </p:txBody>
       </p:sp>
@@ -3358,11 +3348,10 @@
             </a:lvl1pPr>
           </a:lstStyle>
           <a:p>
-            <a:fld id="{E8D425FE-0342-40CE-8049-083A5EA0755F}" type="datetime1">
-              <a:rPr lang="en-CA" smtClean="0"/>
-              <a:t>2024-02-09</a:t>
-            </a:fld>
-            <a:endParaRPr lang="en-CA"/>
+            <a:r>
+              <a:rPr lang="en-CA"/>
+              <a:t>February 2024</a:t>
+            </a:r>
           </a:p>
         </p:txBody>
       </p:sp>
@@ -4032,7 +4021,7 @@
           <p:cNvPr id="5" name="Date Placeholder 4">
             <a:extLst>
               <a:ext uri="{FF2B5EF4-FFF2-40B4-BE49-F238E27FC236}">
-                <a16:creationId xmlns:a16="http://schemas.microsoft.com/office/drawing/2014/main" id="{E862DD50-A7DC-15CF-1B8B-E46978CDD2B0}"/>
+                <a16:creationId xmlns:a16="http://schemas.microsoft.com/office/drawing/2014/main" id="{97E6F2E0-D595-96B9-54AA-750E74527C38}"/>
               </a:ext>
             </a:extLst>
           </p:cNvPr>
@@ -4048,11 +4037,10 @@
           <a:bodyPr/>
           <a:lstStyle/>
           <a:p>
-            <a:fld id="{CDE2BBD3-D8DA-46E4-AF80-CEA58599BB64}" type="datetime1">
-              <a:rPr lang="en-CA" smtClean="0"/>
-              <a:t>2024-02-09</a:t>
-            </a:fld>
-            <a:endParaRPr lang="en-CA"/>
+            <a:r>
+              <a:rPr lang="en-CA"/>
+              <a:t>February 2024</a:t>
+            </a:r>
           </a:p>
         </p:txBody>
       </p:sp>
@@ -4061,7 +4049,7 @@
           <p:cNvPr id="6" name="Footer Placeholder 5">
             <a:extLst>
               <a:ext uri="{FF2B5EF4-FFF2-40B4-BE49-F238E27FC236}">
-                <a16:creationId xmlns:a16="http://schemas.microsoft.com/office/drawing/2014/main" id="{3B56C86A-39A4-1271-2B09-3046063430F7}"/>
+                <a16:creationId xmlns:a16="http://schemas.microsoft.com/office/drawing/2014/main" id="{B81ACD8A-F63C-582C-49EE-3CCAE332CA45}"/>
               </a:ext>
             </a:extLst>
           </p:cNvPr>
@@ -4089,7 +4077,7 @@
           <p:cNvPr id="7" name="Slide Number Placeholder 6">
             <a:extLst>
               <a:ext uri="{FF2B5EF4-FFF2-40B4-BE49-F238E27FC236}">
-                <a16:creationId xmlns:a16="http://schemas.microsoft.com/office/drawing/2014/main" id="{BECF01A4-3E3C-DDE3-E666-A2E5588BD22F}"/>
+                <a16:creationId xmlns:a16="http://schemas.microsoft.com/office/drawing/2014/main" id="{60DE244F-E86F-CF5F-45B0-D92363D6195C}"/>
               </a:ext>
             </a:extLst>
           </p:cNvPr>
@@ -4281,7 +4269,7 @@
           <p:cNvPr id="5" name="Date Placeholder 4">
             <a:extLst>
               <a:ext uri="{FF2B5EF4-FFF2-40B4-BE49-F238E27FC236}">
-                <a16:creationId xmlns:a16="http://schemas.microsoft.com/office/drawing/2014/main" id="{8CF8360E-9227-3966-153A-FF2C8F54E233}"/>
+                <a16:creationId xmlns:a16="http://schemas.microsoft.com/office/drawing/2014/main" id="{52845D78-42F5-2444-36FB-8834B203EE36}"/>
               </a:ext>
             </a:extLst>
           </p:cNvPr>
@@ -4297,11 +4285,10 @@
           <a:bodyPr/>
           <a:lstStyle/>
           <a:p>
-            <a:fld id="{BF9E2049-3C67-40E4-A29D-F321337C24FB}" type="datetime1">
-              <a:rPr lang="en-CA" smtClean="0"/>
-              <a:t>2024-02-09</a:t>
-            </a:fld>
-            <a:endParaRPr lang="en-CA"/>
+            <a:r>
+              <a:rPr lang="en-CA"/>
+              <a:t>February 2024</a:t>
+            </a:r>
           </a:p>
         </p:txBody>
       </p:sp>
@@ -4310,7 +4297,7 @@
           <p:cNvPr id="6" name="Footer Placeholder 5">
             <a:extLst>
               <a:ext uri="{FF2B5EF4-FFF2-40B4-BE49-F238E27FC236}">
-                <a16:creationId xmlns:a16="http://schemas.microsoft.com/office/drawing/2014/main" id="{2049316A-269F-9452-4BAC-8D0F36DE93C5}"/>
+                <a16:creationId xmlns:a16="http://schemas.microsoft.com/office/drawing/2014/main" id="{A9EE6A00-4BFD-8DE8-2EE0-ACC1D838F712}"/>
               </a:ext>
             </a:extLst>
           </p:cNvPr>
@@ -4338,7 +4325,7 @@
           <p:cNvPr id="7" name="Slide Number Placeholder 6">
             <a:extLst>
               <a:ext uri="{FF2B5EF4-FFF2-40B4-BE49-F238E27FC236}">
-                <a16:creationId xmlns:a16="http://schemas.microsoft.com/office/drawing/2014/main" id="{634D0FB6-A728-81EC-61A4-33B1DE09BB45}"/>
+                <a16:creationId xmlns:a16="http://schemas.microsoft.com/office/drawing/2014/main" id="{814B5370-64B6-9F4C-789A-75FACC318380}"/>
               </a:ext>
             </a:extLst>
           </p:cNvPr>
@@ -4506,7 +4493,7 @@
           <p:cNvPr id="5" name="Date Placeholder 4">
             <a:extLst>
               <a:ext uri="{FF2B5EF4-FFF2-40B4-BE49-F238E27FC236}">
-                <a16:creationId xmlns:a16="http://schemas.microsoft.com/office/drawing/2014/main" id="{A870E311-A3B3-F459-EA62-C3D90CC129E7}"/>
+                <a16:creationId xmlns:a16="http://schemas.microsoft.com/office/drawing/2014/main" id="{92973FDF-9A3F-55D6-2E79-55C61A790275}"/>
               </a:ext>
             </a:extLst>
           </p:cNvPr>
@@ -4522,11 +4509,10 @@
           <a:bodyPr/>
           <a:lstStyle/>
           <a:p>
-            <a:fld id="{1E82A53F-8D39-4A7D-8FE5-0F4D1C431326}" type="datetime1">
-              <a:rPr lang="en-CA" smtClean="0"/>
-              <a:t>2024-02-09</a:t>
-            </a:fld>
-            <a:endParaRPr lang="en-CA"/>
+            <a:r>
+              <a:rPr lang="en-CA"/>
+              <a:t>February 2024</a:t>
+            </a:r>
           </a:p>
         </p:txBody>
       </p:sp>
@@ -4535,7 +4521,7 @@
           <p:cNvPr id="6" name="Footer Placeholder 5">
             <a:extLst>
               <a:ext uri="{FF2B5EF4-FFF2-40B4-BE49-F238E27FC236}">
-                <a16:creationId xmlns:a16="http://schemas.microsoft.com/office/drawing/2014/main" id="{2C647487-F329-E07E-3DD9-F3C3CE1FB560}"/>
+                <a16:creationId xmlns:a16="http://schemas.microsoft.com/office/drawing/2014/main" id="{38276AE8-9B2F-6E73-8CC1-16D3B0487B62}"/>
               </a:ext>
             </a:extLst>
           </p:cNvPr>
@@ -4563,7 +4549,7 @@
           <p:cNvPr id="7" name="Slide Number Placeholder 6">
             <a:extLst>
               <a:ext uri="{FF2B5EF4-FFF2-40B4-BE49-F238E27FC236}">
-                <a16:creationId xmlns:a16="http://schemas.microsoft.com/office/drawing/2014/main" id="{E8F83801-6C48-0C1F-8EA1-DFBBAACF7BBA}"/>
+                <a16:creationId xmlns:a16="http://schemas.microsoft.com/office/drawing/2014/main" id="{B658EE9E-0706-80DC-C4DE-DC3A953777D4}"/>
               </a:ext>
             </a:extLst>
           </p:cNvPr>
@@ -4707,7 +4693,7 @@
           <p:cNvPr id="5" name="Date Placeholder 4">
             <a:extLst>
               <a:ext uri="{FF2B5EF4-FFF2-40B4-BE49-F238E27FC236}">
-                <a16:creationId xmlns:a16="http://schemas.microsoft.com/office/drawing/2014/main" id="{D885BBAC-7455-97BD-7FAA-433113192231}"/>
+                <a16:creationId xmlns:a16="http://schemas.microsoft.com/office/drawing/2014/main" id="{8F8FCB7C-A87E-DED7-7ED4-59A43053E157}"/>
               </a:ext>
             </a:extLst>
           </p:cNvPr>
@@ -4723,11 +4709,10 @@
           <a:bodyPr/>
           <a:lstStyle/>
           <a:p>
-            <a:fld id="{805A297F-3CEF-48D2-AF90-A63DC14B47D5}" type="datetime1">
-              <a:rPr lang="en-CA" smtClean="0"/>
-              <a:t>2024-02-09</a:t>
-            </a:fld>
-            <a:endParaRPr lang="en-CA"/>
+            <a:r>
+              <a:rPr lang="en-CA"/>
+              <a:t>February 2024</a:t>
+            </a:r>
           </a:p>
         </p:txBody>
       </p:sp>
@@ -4736,7 +4721,7 @@
           <p:cNvPr id="6" name="Footer Placeholder 5">
             <a:extLst>
               <a:ext uri="{FF2B5EF4-FFF2-40B4-BE49-F238E27FC236}">
-                <a16:creationId xmlns:a16="http://schemas.microsoft.com/office/drawing/2014/main" id="{4A114657-C3FE-6CD4-4330-2147023B0CD7}"/>
+                <a16:creationId xmlns:a16="http://schemas.microsoft.com/office/drawing/2014/main" id="{E61AF76B-0BCB-436A-1618-91C2772DD4B0}"/>
               </a:ext>
             </a:extLst>
           </p:cNvPr>
@@ -4764,7 +4749,7 @@
           <p:cNvPr id="7" name="Slide Number Placeholder 6">
             <a:extLst>
               <a:ext uri="{FF2B5EF4-FFF2-40B4-BE49-F238E27FC236}">
-                <a16:creationId xmlns:a16="http://schemas.microsoft.com/office/drawing/2014/main" id="{5FC9247D-27C9-3ECF-36EA-7237DF5B89F5}"/>
+                <a16:creationId xmlns:a16="http://schemas.microsoft.com/office/drawing/2014/main" id="{085B09B4-CC4C-4401-96D2-678E3A4A73F6}"/>
               </a:ext>
             </a:extLst>
           </p:cNvPr>
@@ -4932,7 +4917,7 @@
           <p:cNvPr id="5" name="Date Placeholder 4">
             <a:extLst>
               <a:ext uri="{FF2B5EF4-FFF2-40B4-BE49-F238E27FC236}">
-                <a16:creationId xmlns:a16="http://schemas.microsoft.com/office/drawing/2014/main" id="{4D67DEF0-B1C9-CDD6-ED59-840B6A55276B}"/>
+                <a16:creationId xmlns:a16="http://schemas.microsoft.com/office/drawing/2014/main" id="{833FCDD6-EF60-F24D-94C2-DA1E755ABA9F}"/>
               </a:ext>
             </a:extLst>
           </p:cNvPr>
@@ -4948,11 +4933,10 @@
           <a:bodyPr/>
           <a:lstStyle/>
           <a:p>
-            <a:fld id="{5548DABF-AE0E-4343-BF9C-7B0427AF7081}" type="datetime1">
-              <a:rPr lang="en-CA" smtClean="0"/>
-              <a:t>2024-02-09</a:t>
-            </a:fld>
-            <a:endParaRPr lang="en-CA"/>
+            <a:r>
+              <a:rPr lang="en-CA"/>
+              <a:t>February 2024</a:t>
+            </a:r>
           </a:p>
         </p:txBody>
       </p:sp>
@@ -4961,7 +4945,7 @@
           <p:cNvPr id="6" name="Footer Placeholder 5">
             <a:extLst>
               <a:ext uri="{FF2B5EF4-FFF2-40B4-BE49-F238E27FC236}">
-                <a16:creationId xmlns:a16="http://schemas.microsoft.com/office/drawing/2014/main" id="{BE507E44-1951-57E2-D32C-985DDC64AA08}"/>
+                <a16:creationId xmlns:a16="http://schemas.microsoft.com/office/drawing/2014/main" id="{6700E2BA-0B41-2661-A55A-BE1287C1211F}"/>
               </a:ext>
             </a:extLst>
           </p:cNvPr>
@@ -4989,7 +4973,7 @@
           <p:cNvPr id="7" name="Slide Number Placeholder 6">
             <a:extLst>
               <a:ext uri="{FF2B5EF4-FFF2-40B4-BE49-F238E27FC236}">
-                <a16:creationId xmlns:a16="http://schemas.microsoft.com/office/drawing/2014/main" id="{8D1947F5-321E-1AEA-8741-E2559D969336}"/>
+                <a16:creationId xmlns:a16="http://schemas.microsoft.com/office/drawing/2014/main" id="{6310E531-1BA7-90F0-A8D1-38C4A3BDCFF4}"/>
               </a:ext>
             </a:extLst>
           </p:cNvPr>
@@ -5192,7 +5176,7 @@
           <p:cNvPr id="6" name="Date Placeholder 5">
             <a:extLst>
               <a:ext uri="{FF2B5EF4-FFF2-40B4-BE49-F238E27FC236}">
-                <a16:creationId xmlns:a16="http://schemas.microsoft.com/office/drawing/2014/main" id="{CFB1C070-A3D5-0D5D-C676-077B8FFFB54E}"/>
+                <a16:creationId xmlns:a16="http://schemas.microsoft.com/office/drawing/2014/main" id="{294CB40A-771B-94FC-9327-FCC3B384F43F}"/>
               </a:ext>
             </a:extLst>
           </p:cNvPr>
@@ -5208,11 +5192,10 @@
           <a:bodyPr/>
           <a:lstStyle/>
           <a:p>
-            <a:fld id="{352B0B93-B6D3-4C2D-8AC5-5B1E88C51491}" type="datetime1">
-              <a:rPr lang="en-CA" smtClean="0"/>
-              <a:t>2024-02-09</a:t>
-            </a:fld>
-            <a:endParaRPr lang="en-CA"/>
+            <a:r>
+              <a:rPr lang="en-CA"/>
+              <a:t>February 2024</a:t>
+            </a:r>
           </a:p>
         </p:txBody>
       </p:sp>
@@ -5221,7 +5204,7 @@
           <p:cNvPr id="7" name="Footer Placeholder 6">
             <a:extLst>
               <a:ext uri="{FF2B5EF4-FFF2-40B4-BE49-F238E27FC236}">
-                <a16:creationId xmlns:a16="http://schemas.microsoft.com/office/drawing/2014/main" id="{1405A68D-200E-46FB-D87C-DFAE75465A09}"/>
+                <a16:creationId xmlns:a16="http://schemas.microsoft.com/office/drawing/2014/main" id="{E8C6DCCD-8073-0760-6D28-5FE62DAD05EA}"/>
               </a:ext>
             </a:extLst>
           </p:cNvPr>
@@ -5249,7 +5232,7 @@
           <p:cNvPr id="8" name="Slide Number Placeholder 7">
             <a:extLst>
               <a:ext uri="{FF2B5EF4-FFF2-40B4-BE49-F238E27FC236}">
-                <a16:creationId xmlns:a16="http://schemas.microsoft.com/office/drawing/2014/main" id="{43196296-886A-E692-4291-DC896F7B1AAA}"/>
+                <a16:creationId xmlns:a16="http://schemas.microsoft.com/office/drawing/2014/main" id="{660368DE-FCC7-5D08-6C9B-62CFDEFD943B}"/>
               </a:ext>
             </a:extLst>
           </p:cNvPr>
@@ -5332,7 +5315,7 @@
           <p:cNvPr id="3" name="Date Placeholder 2">
             <a:extLst>
               <a:ext uri="{FF2B5EF4-FFF2-40B4-BE49-F238E27FC236}">
-                <a16:creationId xmlns:a16="http://schemas.microsoft.com/office/drawing/2014/main" id="{8359BD5B-980D-13C0-1102-D2B0F2F388BE}"/>
+                <a16:creationId xmlns:a16="http://schemas.microsoft.com/office/drawing/2014/main" id="{0514141C-D90D-5B49-DE9E-EDA74ACE0E2A}"/>
               </a:ext>
             </a:extLst>
           </p:cNvPr>
@@ -5348,11 +5331,10 @@
           <a:bodyPr/>
           <a:lstStyle/>
           <a:p>
-            <a:fld id="{F0467FF5-BDBA-42DA-A330-F0B4882F44E0}" type="datetime1">
-              <a:rPr lang="en-CA" smtClean="0"/>
-              <a:t>2024-02-09</a:t>
-            </a:fld>
-            <a:endParaRPr lang="en-CA"/>
+            <a:r>
+              <a:rPr lang="en-CA"/>
+              <a:t>February 2024</a:t>
+            </a:r>
           </a:p>
         </p:txBody>
       </p:sp>
@@ -5361,7 +5343,7 @@
           <p:cNvPr id="4" name="Footer Placeholder 3">
             <a:extLst>
               <a:ext uri="{FF2B5EF4-FFF2-40B4-BE49-F238E27FC236}">
-                <a16:creationId xmlns:a16="http://schemas.microsoft.com/office/drawing/2014/main" id="{6AFCEE38-8EE2-6656-7425-769FC9FC2B4A}"/>
+                <a16:creationId xmlns:a16="http://schemas.microsoft.com/office/drawing/2014/main" id="{BF71D37C-1B09-500C-FD27-DAF8321F38F1}"/>
               </a:ext>
             </a:extLst>
           </p:cNvPr>
@@ -5389,7 +5371,7 @@
           <p:cNvPr id="5" name="Slide Number Placeholder 4">
             <a:extLst>
               <a:ext uri="{FF2B5EF4-FFF2-40B4-BE49-F238E27FC236}">
-                <a16:creationId xmlns:a16="http://schemas.microsoft.com/office/drawing/2014/main" id="{EECD9C88-8200-9560-1320-AC3CF198BA3A}"/>
+                <a16:creationId xmlns:a16="http://schemas.microsoft.com/office/drawing/2014/main" id="{47AB657B-BF95-2A39-F7F3-D7D44B91FA42}"/>
               </a:ext>
             </a:extLst>
           </p:cNvPr>
@@ -5475,7 +5457,7 @@
         <p:spPr/>
         <p:txBody>
           <a:bodyPr>
-            <a:normAutofit fontScale="40000" lnSpcReduction="20000"/>
+            <a:normAutofit fontScale="70000" lnSpcReduction="20000"/>
           </a:bodyPr>
           <a:lstStyle/>
           <a:p>
@@ -5508,6 +5490,24 @@
               <a:t>Solution: split data by time instead of random sampling whenever possible (ex., time-series cross-validation).</a:t>
             </a:r>
           </a:p>
+        </p:txBody>
+      </p:sp>
+      <p:sp>
+        <p:nvSpPr>
+          <p:cNvPr id="4" name="Content Placeholder 3"/>
+          <p:cNvSpPr>
+            <a:spLocks noGrp="1"/>
+          </p:cNvSpPr>
+          <p:nvPr>
+            <p:ph sz="half" idx="2"/>
+          </p:nvPr>
+        </p:nvSpPr>
+        <p:spPr/>
+        <p:txBody>
+          <a:bodyPr>
+            <a:normAutofit fontScale="70000" lnSpcReduction="20000"/>
+          </a:bodyPr>
+          <a:lstStyle/>
           <a:p>
             <a:pPr lvl="0"/>
             <a:r>
@@ -5548,90 +5548,6 @@
             <a:pPr lvl="1"/>
             <a:r>
               <a:t>Solution: split data before calculation and ensure only training data is used (use a framework).</a:t>
-            </a:r>
-          </a:p>
-        </p:txBody>
-      </p:sp>
-      <p:sp>
-        <p:nvSpPr>
-          <p:cNvPr id="4" name="Content Placeholder 3"/>
-          <p:cNvSpPr>
-            <a:spLocks noGrp="1"/>
-          </p:cNvSpPr>
-          <p:nvPr>
-            <p:ph sz="half" idx="2"/>
-          </p:nvPr>
-        </p:nvSpPr>
-        <p:spPr/>
-        <p:txBody>
-          <a:bodyPr>
-            <a:normAutofit fontScale="40000" lnSpcReduction="20000"/>
-          </a:bodyPr>
-          <a:lstStyle/>
-          <a:p>
-            <a:pPr lvl="0"/>
-            <a:r>
-              <a:t>Poor handling of data duplication.</a:t>
-            </a:r>
-          </a:p>
-          <a:p>
-            <a:pPr lvl="1"/>
-            <a:r>
-              <a:t>Failure to remove duplicates or near-duplicates before splitting the data.</a:t>
-            </a:r>
-          </a:p>
-          <a:p>
-            <a:pPr lvl="1"/>
-            <a:r>
-              <a:t>Data duplication can result from data collection or merging of different data sources.</a:t>
-            </a:r>
-          </a:p>
-          <a:p>
-            <a:pPr lvl="1"/>
-            <a:r>
-              <a:t>As well, synthetic oversampling can induce duplication.</a:t>
-            </a:r>
-          </a:p>
-          <a:p>
-            <a:pPr lvl="1"/>
-            <a:r>
-              <a:t>Solution: check for duplicates before splitting and also after splitting.</a:t>
-            </a:r>
-          </a:p>
-          <a:p>
-            <a:pPr lvl="0"/>
-            <a:r>
-              <a:t>Group leakage.</a:t>
-            </a:r>
-          </a:p>
-          <a:p>
-            <a:pPr lvl="1"/>
-            <a:r>
-              <a:t>Similar to duplication, where a group of examples have strongly correlated labels but are divided into different splits.</a:t>
-            </a:r>
-          </a:p>
-          <a:p>
-            <a:pPr lvl="1"/>
-            <a:r>
-              <a:t>Example: in object detection, several pictures are taken a few seconds apart and almost identical.</a:t>
-            </a:r>
-          </a:p>
-          <a:p>
-            <a:pPr lvl="0"/>
-            <a:r>
-              <a:t>Leakage from the data generation process</a:t>
-            </a:r>
-          </a:p>
-          <a:p>
-            <a:pPr lvl="1"/>
-            <a:r>
-              <a:t>The sampling mechanism may induce duplication.</a:t>
-            </a:r>
-          </a:p>
-          <a:p>
-            <a:pPr lvl="1"/>
-            <a:r>
-              <a:t>Example: patient data in critical condition is duplicated because more tests are run.</a:t>
             </a:r>
           </a:p>
         </p:txBody>
@@ -5641,7 +5557,7 @@
           <p:cNvPr id="5" name="Date Placeholder 4">
             <a:extLst>
               <a:ext uri="{FF2B5EF4-FFF2-40B4-BE49-F238E27FC236}">
-                <a16:creationId xmlns:a16="http://schemas.microsoft.com/office/drawing/2014/main" id="{E1CE4CF2-9D00-C837-DF96-AA087741DB16}"/>
+                <a16:creationId xmlns:a16="http://schemas.microsoft.com/office/drawing/2014/main" id="{752C62CA-5405-C709-A979-1A64BAB7F2BF}"/>
               </a:ext>
             </a:extLst>
           </p:cNvPr>
@@ -5657,11 +5573,10 @@
           <a:bodyPr/>
           <a:lstStyle/>
           <a:p>
-            <a:fld id="{985D3E82-5B80-4B87-97F0-2F1A4D8693A0}" type="datetime1">
-              <a:rPr lang="en-CA" smtClean="0"/>
-              <a:t>2024-02-09</a:t>
-            </a:fld>
-            <a:endParaRPr lang="en-CA"/>
+            <a:r>
+              <a:rPr lang="en-CA"/>
+              <a:t>February 2024</a:t>
+            </a:r>
           </a:p>
         </p:txBody>
       </p:sp>
@@ -5670,7 +5585,7 @@
           <p:cNvPr id="6" name="Footer Placeholder 5">
             <a:extLst>
               <a:ext uri="{FF2B5EF4-FFF2-40B4-BE49-F238E27FC236}">
-                <a16:creationId xmlns:a16="http://schemas.microsoft.com/office/drawing/2014/main" id="{B2138DCA-C398-0E32-DB18-CC9A5D6A593A}"/>
+                <a16:creationId xmlns:a16="http://schemas.microsoft.com/office/drawing/2014/main" id="{4D5C0E3E-AC1F-00F7-026B-3B366BC6AF6F}"/>
               </a:ext>
             </a:extLst>
           </p:cNvPr>
@@ -5698,7 +5613,7 @@
           <p:cNvPr id="7" name="Slide Number Placeholder 6">
             <a:extLst>
               <a:ext uri="{FF2B5EF4-FFF2-40B4-BE49-F238E27FC236}">
-                <a16:creationId xmlns:a16="http://schemas.microsoft.com/office/drawing/2014/main" id="{89212014-9CC9-9E46-7C12-9848AAB794D7}"/>
+                <a16:creationId xmlns:a16="http://schemas.microsoft.com/office/drawing/2014/main" id="{D79F5142-320C-38D6-3CBC-72BE81BE632E}"/>
               </a:ext>
             </a:extLst>
           </p:cNvPr>
@@ -5766,7 +5681,7 @@
               <a:buNone/>
             </a:pPr>
             <a:r>
-              <a:t>Detecting Data Leakage</a:t>
+              <a:t>Data Leakage (cont.)</a:t>
             </a:r>
           </a:p>
         </p:txBody>
@@ -5784,25 +5699,55 @@
         <p:spPr/>
         <p:txBody>
           <a:bodyPr>
-            <a:normAutofit fontScale="92500" lnSpcReduction="10000"/>
+            <a:normAutofit fontScale="70000" lnSpcReduction="20000"/>
           </a:bodyPr>
           <a:lstStyle/>
           <a:p>
             <a:pPr lvl="0"/>
             <a:r>
-              <a:t>Measure the predictive power of each feature.</a:t>
+              <a:t>Poor handling of data duplication.</a:t>
             </a:r>
           </a:p>
           <a:p>
             <a:pPr lvl="1"/>
             <a:r>
-              <a:t>Investigate unusually high readings.</a:t>
+              <a:t>Failure to remove duplicates or near-duplicates before splitting the data.</a:t>
             </a:r>
           </a:p>
           <a:p>
             <a:pPr lvl="1"/>
             <a:r>
-              <a:t>Investigate data generation and if we can derive a valid explanation.</a:t>
+              <a:t>Data duplication can result from data collection or merging of different data sources.</a:t>
+            </a:r>
+          </a:p>
+          <a:p>
+            <a:pPr lvl="1"/>
+            <a:r>
+              <a:t>As well, synthetic oversampling can induce duplication.</a:t>
+            </a:r>
+          </a:p>
+          <a:p>
+            <a:pPr lvl="1"/>
+            <a:r>
+              <a:t>Solution: check for duplicates before splitting and also after splitting.</a:t>
+            </a:r>
+          </a:p>
+          <a:p>
+            <a:pPr lvl="0"/>
+            <a:r>
+              <a:t>Group leakage.</a:t>
+            </a:r>
+          </a:p>
+          <a:p>
+            <a:pPr lvl="1"/>
+            <a:r>
+              <a:t>Similar to duplication, where a group of examples have strongly correlated labels but are divided into different splits.</a:t>
+            </a:r>
+          </a:p>
+          <a:p>
+            <a:pPr lvl="1"/>
+            <a:r>
+              <a:t>Example: in object detection, several pictures are taken a few seconds apart and almost identical.</a:t>
             </a:r>
           </a:p>
         </p:txBody>
@@ -5820,25 +5765,25 @@
         <p:spPr/>
         <p:txBody>
           <a:bodyPr>
-            <a:normAutofit fontScale="92500" lnSpcReduction="10000"/>
+            <a:normAutofit fontScale="70000" lnSpcReduction="20000"/>
           </a:bodyPr>
           <a:lstStyle/>
           <a:p>
             <a:pPr lvl="0"/>
             <a:r>
-              <a:t>Perform ablation studies (remove one feature at a time) to measure how important a feature or set of features is to your model.</a:t>
+              <a:t>Leakage from the data generation process</a:t>
             </a:r>
           </a:p>
           <a:p>
             <a:pPr lvl="1"/>
             <a:r>
-              <a:t>If removing a feature causes the model’s performance to deteriorate significantly, investigate why that feature is so important.</a:t>
-            </a:r>
-          </a:p>
-          <a:p>
-            <a:pPr lvl="0"/>
-            <a:r>
-              <a:t>Pay attention to new features added to the model.</a:t>
+              <a:t>The sampling mechanism may induce duplication.</a:t>
+            </a:r>
+          </a:p>
+          <a:p>
+            <a:pPr lvl="1"/>
+            <a:r>
+              <a:t>Example: patient data in critical condition is duplicated because more tests are run.</a:t>
             </a:r>
           </a:p>
         </p:txBody>
@@ -5848,7 +5793,7 @@
           <p:cNvPr id="5" name="Date Placeholder 4">
             <a:extLst>
               <a:ext uri="{FF2B5EF4-FFF2-40B4-BE49-F238E27FC236}">
-                <a16:creationId xmlns:a16="http://schemas.microsoft.com/office/drawing/2014/main" id="{F353A990-1228-8328-34CC-2DBE7A8B19C8}"/>
+                <a16:creationId xmlns:a16="http://schemas.microsoft.com/office/drawing/2014/main" id="{1EACF91E-1982-A54A-427A-976DDEB1B94B}"/>
               </a:ext>
             </a:extLst>
           </p:cNvPr>
@@ -5864,11 +5809,10 @@
           <a:bodyPr/>
           <a:lstStyle/>
           <a:p>
-            <a:fld id="{53668932-F0DF-40A2-BA10-7C27C63AB9E1}" type="datetime1">
-              <a:rPr lang="en-CA" smtClean="0"/>
-              <a:t>2024-02-09</a:t>
-            </a:fld>
-            <a:endParaRPr lang="en-CA"/>
+            <a:r>
+              <a:rPr lang="en-CA"/>
+              <a:t>February 2024</a:t>
+            </a:r>
           </a:p>
         </p:txBody>
       </p:sp>
@@ -5877,7 +5821,7 @@
           <p:cNvPr id="6" name="Footer Placeholder 5">
             <a:extLst>
               <a:ext uri="{FF2B5EF4-FFF2-40B4-BE49-F238E27FC236}">
-                <a16:creationId xmlns:a16="http://schemas.microsoft.com/office/drawing/2014/main" id="{B0EA6109-6CD6-36D3-06D0-64AA2BF2706F}"/>
+                <a16:creationId xmlns:a16="http://schemas.microsoft.com/office/drawing/2014/main" id="{ACAC7B7B-FC26-3BA2-5D73-6096047A043D}"/>
               </a:ext>
             </a:extLst>
           </p:cNvPr>
@@ -5905,7 +5849,7 @@
           <p:cNvPr id="7" name="Slide Number Placeholder 6">
             <a:extLst>
               <a:ext uri="{FF2B5EF4-FFF2-40B4-BE49-F238E27FC236}">
-                <a16:creationId xmlns:a16="http://schemas.microsoft.com/office/drawing/2014/main" id="{E13AA14E-2789-A377-4E19-AAF7D0C393CD}"/>
+                <a16:creationId xmlns:a16="http://schemas.microsoft.com/office/drawing/2014/main" id="{30A16AC8-7B35-B41F-175F-427379B6528E}"/>
               </a:ext>
             </a:extLst>
           </p:cNvPr>
@@ -5964,12 +5908,7 @@
             <p:ph type="title"/>
           </p:nvPr>
         </p:nvSpPr>
-        <p:spPr>
-          <a:xfrm>
-            <a:off x="603504" y="767419"/>
-            <a:ext cx="10780776" cy="3355848"/>
-          </a:xfrm>
-        </p:spPr>
+        <p:spPr/>
         <p:txBody>
           <a:bodyPr/>
           <a:lstStyle/>
@@ -5978,17 +5917,89 @@
               <a:buNone/>
             </a:pPr>
             <a:r>
-              <a:t>Engineering Good Features</a:t>
-            </a:r>
-          </a:p>
-        </p:txBody>
-      </p:sp>
-      <p:sp>
-        <p:nvSpPr>
-          <p:cNvPr id="3" name="Date Placeholder 2">
+              <a:t>Detecting Data Leakage</a:t>
+            </a:r>
+          </a:p>
+        </p:txBody>
+      </p:sp>
+      <p:sp>
+        <p:nvSpPr>
+          <p:cNvPr id="3" name="Content Placeholder 2"/>
+          <p:cNvSpPr>
+            <a:spLocks noGrp="1"/>
+          </p:cNvSpPr>
+          <p:nvPr>
+            <p:ph sz="half" idx="1"/>
+          </p:nvPr>
+        </p:nvSpPr>
+        <p:spPr/>
+        <p:txBody>
+          <a:bodyPr>
+            <a:normAutofit fontScale="92500" lnSpcReduction="10000"/>
+          </a:bodyPr>
+          <a:lstStyle/>
+          <a:p>
+            <a:pPr lvl="0"/>
+            <a:r>
+              <a:t>Measure the predictive power of each feature.</a:t>
+            </a:r>
+          </a:p>
+          <a:p>
+            <a:pPr lvl="1"/>
+            <a:r>
+              <a:t>Investigate unusually high readings.</a:t>
+            </a:r>
+          </a:p>
+          <a:p>
+            <a:pPr lvl="1"/>
+            <a:r>
+              <a:t>Investigate data generation and if we can derive a valid explanation.</a:t>
+            </a:r>
+          </a:p>
+        </p:txBody>
+      </p:sp>
+      <p:sp>
+        <p:nvSpPr>
+          <p:cNvPr id="4" name="Content Placeholder 3"/>
+          <p:cNvSpPr>
+            <a:spLocks noGrp="1"/>
+          </p:cNvSpPr>
+          <p:nvPr>
+            <p:ph sz="half" idx="2"/>
+          </p:nvPr>
+        </p:nvSpPr>
+        <p:spPr/>
+        <p:txBody>
+          <a:bodyPr>
+            <a:normAutofit fontScale="92500" lnSpcReduction="10000"/>
+          </a:bodyPr>
+          <a:lstStyle/>
+          <a:p>
+            <a:pPr lvl="0"/>
+            <a:r>
+              <a:t>Perform ablation studies (remove one feature at a time) to measure how important a feature or set of features is to your model.</a:t>
+            </a:r>
+          </a:p>
+          <a:p>
+            <a:pPr lvl="1"/>
+            <a:r>
+              <a:t>If removing a feature causes the model’s performance to deteriorate significantly, investigate why that feature is so important.</a:t>
+            </a:r>
+          </a:p>
+          <a:p>
+            <a:pPr lvl="0"/>
+            <a:r>
+              <a:t>Pay attention to new features added to the model.</a:t>
+            </a:r>
+          </a:p>
+        </p:txBody>
+      </p:sp>
+      <p:sp>
+        <p:nvSpPr>
+          <p:cNvPr id="5" name="Date Placeholder 4">
             <a:extLst>
               <a:ext uri="{FF2B5EF4-FFF2-40B4-BE49-F238E27FC236}">
-                <a16:creationId xmlns:a16="http://schemas.microsoft.com/office/drawing/2014/main" id="{9159B355-9F3D-CD48-7300-BCFCD162289F}"/>
+                <a16:creationId xmlns:a16="http://schemas.microsoft.com/office/drawing/2014/main" id="{25816E24-6DC0-66CA-EC7C-4EEA3EB41264}"/>
               </a:ext>
             </a:extLst>
           </p:cNvPr>
@@ -6004,20 +6015,19 @@
           <a:bodyPr/>
           <a:lstStyle/>
           <a:p>
-            <a:fld id="{E8A84A19-221D-4167-899E-290962DB682E}" type="datetime1">
-              <a:rPr lang="en-CA" smtClean="0"/>
-              <a:t>2024-02-09</a:t>
-            </a:fld>
-            <a:endParaRPr lang="en-CA"/>
-          </a:p>
-        </p:txBody>
-      </p:sp>
-      <p:sp>
-        <p:nvSpPr>
-          <p:cNvPr id="4" name="Footer Placeholder 3">
+            <a:r>
+              <a:rPr lang="en-CA"/>
+              <a:t>February 2024</a:t>
+            </a:r>
+          </a:p>
+        </p:txBody>
+      </p:sp>
+      <p:sp>
+        <p:nvSpPr>
+          <p:cNvPr id="6" name="Footer Placeholder 5">
             <a:extLst>
               <a:ext uri="{FF2B5EF4-FFF2-40B4-BE49-F238E27FC236}">
-                <a16:creationId xmlns:a16="http://schemas.microsoft.com/office/drawing/2014/main" id="{E9C7BA4F-069E-ED07-FAA7-93ABDDC41CA5}"/>
+                <a16:creationId xmlns:a16="http://schemas.microsoft.com/office/drawing/2014/main" id="{943FA10D-3C30-D51D-2846-E0AE259AE360}"/>
               </a:ext>
             </a:extLst>
           </p:cNvPr>
@@ -6042,10 +6052,10 @@
       </p:sp>
       <p:sp>
         <p:nvSpPr>
-          <p:cNvPr id="5" name="Slide Number Placeholder 4">
+          <p:cNvPr id="7" name="Slide Number Placeholder 6">
             <a:extLst>
               <a:ext uri="{FF2B5EF4-FFF2-40B4-BE49-F238E27FC236}">
-                <a16:creationId xmlns:a16="http://schemas.microsoft.com/office/drawing/2014/main" id="{F2E6B7C1-C6A7-103A-1888-E643086C66B8}"/>
+                <a16:creationId xmlns:a16="http://schemas.microsoft.com/office/drawing/2014/main" id="{9B1B75EA-82C1-BF4B-3033-24F31993EFD4}"/>
               </a:ext>
             </a:extLst>
           </p:cNvPr>
@@ -6215,7 +6225,7 @@
           <p:cNvPr id="5" name="Date Placeholder 4">
             <a:extLst>
               <a:ext uri="{FF2B5EF4-FFF2-40B4-BE49-F238E27FC236}">
-                <a16:creationId xmlns:a16="http://schemas.microsoft.com/office/drawing/2014/main" id="{908534F0-0A8F-1B7C-01D2-4980146A7B99}"/>
+                <a16:creationId xmlns:a16="http://schemas.microsoft.com/office/drawing/2014/main" id="{3BE1BA85-3113-4516-DDCE-1204F66A4E0B}"/>
               </a:ext>
             </a:extLst>
           </p:cNvPr>
@@ -6231,11 +6241,10 @@
           <a:bodyPr/>
           <a:lstStyle/>
           <a:p>
-            <a:fld id="{E55221E7-0AC1-4473-AE84-E68217BB46B8}" type="datetime1">
-              <a:rPr lang="en-CA" smtClean="0"/>
-              <a:t>2024-02-09</a:t>
-            </a:fld>
-            <a:endParaRPr lang="en-CA"/>
+            <a:r>
+              <a:rPr lang="en-CA"/>
+              <a:t>February 2024</a:t>
+            </a:r>
           </a:p>
         </p:txBody>
       </p:sp>
@@ -6244,7 +6253,7 @@
           <p:cNvPr id="6" name="Footer Placeholder 5">
             <a:extLst>
               <a:ext uri="{FF2B5EF4-FFF2-40B4-BE49-F238E27FC236}">
-                <a16:creationId xmlns:a16="http://schemas.microsoft.com/office/drawing/2014/main" id="{20F3A9B4-9D66-A705-A346-8F1CEE5E9249}"/>
+                <a16:creationId xmlns:a16="http://schemas.microsoft.com/office/drawing/2014/main" id="{939BCBAD-0967-9FAA-ED4C-35F482AE2CBF}"/>
               </a:ext>
             </a:extLst>
           </p:cNvPr>
@@ -6272,7 +6281,7 @@
           <p:cNvPr id="7" name="Slide Number Placeholder 6">
             <a:extLst>
               <a:ext uri="{FF2B5EF4-FFF2-40B4-BE49-F238E27FC236}">
-                <a16:creationId xmlns:a16="http://schemas.microsoft.com/office/drawing/2014/main" id="{B9DE4AC6-1C1D-0EC0-3AA4-6F3F30246A86}"/>
+                <a16:creationId xmlns:a16="http://schemas.microsoft.com/office/drawing/2014/main" id="{6D3B699C-3675-6252-A32D-14198F07941B}"/>
               </a:ext>
             </a:extLst>
           </p:cNvPr>
@@ -6331,7 +6340,12 @@
             <p:ph type="title"/>
           </p:nvPr>
         </p:nvSpPr>
-        <p:spPr/>
+        <p:spPr>
+          <a:xfrm>
+            <a:off x="603504" y="767419"/>
+            <a:ext cx="10780776" cy="3355848"/>
+          </a:xfrm>
+        </p:spPr>
         <p:txBody>
           <a:bodyPr/>
           <a:lstStyle/>
@@ -6340,95 +6354,17 @@
               <a:buNone/>
             </a:pPr>
             <a:r>
-              <a:t>Too Many Features</a:t>
-            </a:r>
-          </a:p>
-        </p:txBody>
-      </p:sp>
-      <p:sp>
-        <p:nvSpPr>
-          <p:cNvPr id="3" name="Content Placeholder 2"/>
-          <p:cNvSpPr>
-            <a:spLocks noGrp="1"/>
-          </p:cNvSpPr>
-          <p:nvPr>
-            <p:ph sz="half" idx="1"/>
-          </p:nvPr>
-        </p:nvSpPr>
-        <p:spPr/>
-        <p:txBody>
-          <a:bodyPr>
-            <a:normAutofit fontScale="92500" lnSpcReduction="20000"/>
-          </a:bodyPr>
-          <a:lstStyle/>
-          <a:p>
-            <a:pPr lvl="0"/>
-            <a:r>
-              <a:t>Too many features can be bad during training and model service.</a:t>
-            </a:r>
-          </a:p>
-          <a:p>
-            <a:pPr lvl="0"/>
-            <a:r>
-              <a:t>More features, more opportunities for data leakage.</a:t>
-            </a:r>
-          </a:p>
-          <a:p>
-            <a:pPr lvl="0"/>
-            <a:r>
-              <a:t>Too many features cause overfitting.</a:t>
-            </a:r>
-          </a:p>
-          <a:p>
-            <a:pPr lvl="0"/>
-            <a:r>
-              <a:t>More features require more memory to serve a model, which can increase hardware requirements and cost.</a:t>
-            </a:r>
-          </a:p>
-        </p:txBody>
-      </p:sp>
-      <p:sp>
-        <p:nvSpPr>
-          <p:cNvPr id="4" name="Content Placeholder 3"/>
-          <p:cNvSpPr>
-            <a:spLocks noGrp="1"/>
-          </p:cNvSpPr>
-          <p:nvPr>
-            <p:ph sz="half" idx="2"/>
-          </p:nvPr>
-        </p:nvSpPr>
-        <p:spPr/>
-        <p:txBody>
-          <a:bodyPr>
-            <a:normAutofit fontScale="92500" lnSpcReduction="20000"/>
-          </a:bodyPr>
-          <a:lstStyle/>
-          <a:p>
-            <a:pPr lvl="0"/>
-            <a:r>
-              <a:t>Too many features can increase inference latency.</a:t>
-            </a:r>
-          </a:p>
-          <a:p>
-            <a:pPr lvl="0"/>
-            <a:r>
-              <a:t>Useless features become technicala debt.</a:t>
-            </a:r>
-          </a:p>
-          <a:p>
-            <a:pPr lvl="0"/>
-            <a:r>
-              <a:t>In principle, if a feature is not useful for prediction, regularization should get rid of it. In practice, it may be faster for the feature not to be available to the model in the first place.</a:t>
-            </a:r>
-          </a:p>
-        </p:txBody>
-      </p:sp>
-      <p:sp>
-        <p:nvSpPr>
-          <p:cNvPr id="5" name="Date Placeholder 4">
+              <a:t>Engineering Good Features</a:t>
+            </a:r>
+          </a:p>
+        </p:txBody>
+      </p:sp>
+      <p:sp>
+        <p:nvSpPr>
+          <p:cNvPr id="3" name="Date Placeholder 2">
             <a:extLst>
               <a:ext uri="{FF2B5EF4-FFF2-40B4-BE49-F238E27FC236}">
-                <a16:creationId xmlns:a16="http://schemas.microsoft.com/office/drawing/2014/main" id="{2E8E5789-5144-4FAD-EB65-EF23B0D98FE4}"/>
+                <a16:creationId xmlns:a16="http://schemas.microsoft.com/office/drawing/2014/main" id="{EFBEACF7-413C-CFDF-0696-FB1CC14C2E87}"/>
               </a:ext>
             </a:extLst>
           </p:cNvPr>
@@ -6444,20 +6380,19 @@
           <a:bodyPr/>
           <a:lstStyle/>
           <a:p>
-            <a:fld id="{BB860C1F-878D-4D34-AA61-7AFF971B962B}" type="datetime1">
-              <a:rPr lang="en-CA" smtClean="0"/>
-              <a:t>2024-02-09</a:t>
-            </a:fld>
-            <a:endParaRPr lang="en-CA"/>
-          </a:p>
-        </p:txBody>
-      </p:sp>
-      <p:sp>
-        <p:nvSpPr>
-          <p:cNvPr id="6" name="Footer Placeholder 5">
+            <a:r>
+              <a:rPr lang="en-CA"/>
+              <a:t>February 2024</a:t>
+            </a:r>
+          </a:p>
+        </p:txBody>
+      </p:sp>
+      <p:sp>
+        <p:nvSpPr>
+          <p:cNvPr id="4" name="Footer Placeholder 3">
             <a:extLst>
               <a:ext uri="{FF2B5EF4-FFF2-40B4-BE49-F238E27FC236}">
-                <a16:creationId xmlns:a16="http://schemas.microsoft.com/office/drawing/2014/main" id="{A586099E-EDE0-866D-76DD-A1A353E1C306}"/>
+                <a16:creationId xmlns:a16="http://schemas.microsoft.com/office/drawing/2014/main" id="{A59BA305-7067-6FED-28BC-6820EDE338AB}"/>
               </a:ext>
             </a:extLst>
           </p:cNvPr>
@@ -6482,10 +6417,10 @@
       </p:sp>
       <p:sp>
         <p:nvSpPr>
-          <p:cNvPr id="7" name="Slide Number Placeholder 6">
+          <p:cNvPr id="5" name="Slide Number Placeholder 4">
             <a:extLst>
               <a:ext uri="{FF2B5EF4-FFF2-40B4-BE49-F238E27FC236}">
-                <a16:creationId xmlns:a16="http://schemas.microsoft.com/office/drawing/2014/main" id="{F4941687-A181-D05B-A4B8-4584AA051667}"/>
+                <a16:creationId xmlns:a16="http://schemas.microsoft.com/office/drawing/2014/main" id="{9FDD5BB7-2E20-680A-CA8E-91BF1687634F}"/>
               </a:ext>
             </a:extLst>
           </p:cNvPr>
@@ -6544,12 +6479,7 @@
             <p:ph type="title"/>
           </p:nvPr>
         </p:nvSpPr>
-        <p:spPr>
-          <a:xfrm>
-            <a:off x="603504" y="767419"/>
-            <a:ext cx="10780776" cy="3355848"/>
-          </a:xfrm>
-        </p:spPr>
+        <p:spPr/>
         <p:txBody>
           <a:bodyPr/>
           <a:lstStyle/>
@@ -6558,17 +6488,95 @@
               <a:buNone/>
             </a:pPr>
             <a:r>
-              <a:t>Feature Importance</a:t>
-            </a:r>
-          </a:p>
-        </p:txBody>
-      </p:sp>
-      <p:sp>
-        <p:nvSpPr>
-          <p:cNvPr id="3" name="Date Placeholder 2">
+              <a:t>Too Many Features</a:t>
+            </a:r>
+          </a:p>
+        </p:txBody>
+      </p:sp>
+      <p:sp>
+        <p:nvSpPr>
+          <p:cNvPr id="3" name="Content Placeholder 2"/>
+          <p:cNvSpPr>
+            <a:spLocks noGrp="1"/>
+          </p:cNvSpPr>
+          <p:nvPr>
+            <p:ph sz="half" idx="1"/>
+          </p:nvPr>
+        </p:nvSpPr>
+        <p:spPr/>
+        <p:txBody>
+          <a:bodyPr>
+            <a:normAutofit fontScale="92500" lnSpcReduction="20000"/>
+          </a:bodyPr>
+          <a:lstStyle/>
+          <a:p>
+            <a:pPr lvl="0"/>
+            <a:r>
+              <a:t>Too many features can be bad during training and model service.</a:t>
+            </a:r>
+          </a:p>
+          <a:p>
+            <a:pPr lvl="0"/>
+            <a:r>
+              <a:t>More features, more opportunities for data leakage.</a:t>
+            </a:r>
+          </a:p>
+          <a:p>
+            <a:pPr lvl="0"/>
+            <a:r>
+              <a:t>Too many features cause overfitting.</a:t>
+            </a:r>
+          </a:p>
+          <a:p>
+            <a:pPr lvl="0"/>
+            <a:r>
+              <a:t>More features require more memory to serve a model, which can increase hardware requirements and cost.</a:t>
+            </a:r>
+          </a:p>
+        </p:txBody>
+      </p:sp>
+      <p:sp>
+        <p:nvSpPr>
+          <p:cNvPr id="4" name="Content Placeholder 3"/>
+          <p:cNvSpPr>
+            <a:spLocks noGrp="1"/>
+          </p:cNvSpPr>
+          <p:nvPr>
+            <p:ph sz="half" idx="2"/>
+          </p:nvPr>
+        </p:nvSpPr>
+        <p:spPr/>
+        <p:txBody>
+          <a:bodyPr>
+            <a:normAutofit fontScale="92500" lnSpcReduction="20000"/>
+          </a:bodyPr>
+          <a:lstStyle/>
+          <a:p>
+            <a:pPr lvl="0"/>
+            <a:r>
+              <a:t>Too many features can increase inference latency.</a:t>
+            </a:r>
+          </a:p>
+          <a:p>
+            <a:pPr lvl="0"/>
+            <a:r>
+              <a:t>Useless features become technicala debt.</a:t>
+            </a:r>
+          </a:p>
+          <a:p>
+            <a:pPr lvl="0"/>
+            <a:r>
+              <a:t>In principle, if a feature is not useful for prediction, regularization should get rid of it. In practice, it may be faster for the feature not to be available to the model in the first place.</a:t>
+            </a:r>
+          </a:p>
+        </p:txBody>
+      </p:sp>
+      <p:sp>
+        <p:nvSpPr>
+          <p:cNvPr id="5" name="Date Placeholder 4">
             <a:extLst>
               <a:ext uri="{FF2B5EF4-FFF2-40B4-BE49-F238E27FC236}">
-                <a16:creationId xmlns:a16="http://schemas.microsoft.com/office/drawing/2014/main" id="{D0D9D34D-3B4A-2477-F34D-42E11E7F2935}"/>
+                <a16:creationId xmlns:a16="http://schemas.microsoft.com/office/drawing/2014/main" id="{96668EEF-AF61-14E2-6C2D-B30E7DF99A25}"/>
               </a:ext>
             </a:extLst>
           </p:cNvPr>
@@ -6584,20 +6592,19 @@
           <a:bodyPr/>
           <a:lstStyle/>
           <a:p>
-            <a:fld id="{D2AD571F-A660-4AF0-8EC1-B089E5BD6B4E}" type="datetime1">
-              <a:rPr lang="en-CA" smtClean="0"/>
-              <a:t>2024-02-09</a:t>
-            </a:fld>
-            <a:endParaRPr lang="en-CA"/>
-          </a:p>
-        </p:txBody>
-      </p:sp>
-      <p:sp>
-        <p:nvSpPr>
-          <p:cNvPr id="4" name="Footer Placeholder 3">
+            <a:r>
+              <a:rPr lang="en-CA"/>
+              <a:t>February 2024</a:t>
+            </a:r>
+          </a:p>
+        </p:txBody>
+      </p:sp>
+      <p:sp>
+        <p:nvSpPr>
+          <p:cNvPr id="6" name="Footer Placeholder 5">
             <a:extLst>
               <a:ext uri="{FF2B5EF4-FFF2-40B4-BE49-F238E27FC236}">
-                <a16:creationId xmlns:a16="http://schemas.microsoft.com/office/drawing/2014/main" id="{3B0D806F-0676-E0E8-4456-5F646B27B470}"/>
+                <a16:creationId xmlns:a16="http://schemas.microsoft.com/office/drawing/2014/main" id="{B6576885-08FC-1501-642B-805D48FA4726}"/>
               </a:ext>
             </a:extLst>
           </p:cNvPr>
@@ -6622,10 +6629,10 @@
       </p:sp>
       <p:sp>
         <p:nvSpPr>
-          <p:cNvPr id="5" name="Slide Number Placeholder 4">
+          <p:cNvPr id="7" name="Slide Number Placeholder 6">
             <a:extLst>
               <a:ext uri="{FF2B5EF4-FFF2-40B4-BE49-F238E27FC236}">
-                <a16:creationId xmlns:a16="http://schemas.microsoft.com/office/drawing/2014/main" id="{0493F823-2132-8F68-FA5E-CA16118AE1D2}"/>
+                <a16:creationId xmlns:a16="http://schemas.microsoft.com/office/drawing/2014/main" id="{5CAA6FFA-B7E0-C603-B3BE-4B4FE5F0446A}"/>
               </a:ext>
             </a:extLst>
           </p:cNvPr>
@@ -6658,6 +6665,145 @@
 </file>
 
 <file path=ppt/slides/slide22.xml><?xml version="1.0" encoding="utf-8"?>
+<p:sld xmlns:a="http://schemas.openxmlformats.org/drawingml/2006/main" xmlns:r="http://schemas.openxmlformats.org/officeDocument/2006/relationships" xmlns:p="http://schemas.openxmlformats.org/presentationml/2006/main">
+  <p:cSld>
+    <p:spTree>
+      <p:nvGrpSpPr>
+        <p:cNvPr id="1" name=""/>
+        <p:cNvGrpSpPr/>
+        <p:nvPr/>
+      </p:nvGrpSpPr>
+      <p:grpSpPr>
+        <a:xfrm>
+          <a:off x="0" y="0"/>
+          <a:ext cx="0" cy="0"/>
+          <a:chOff x="0" y="0"/>
+          <a:chExt cx="0" cy="0"/>
+        </a:xfrm>
+      </p:grpSpPr>
+      <p:sp>
+        <p:nvSpPr>
+          <p:cNvPr id="2" name="Title 1"/>
+          <p:cNvSpPr>
+            <a:spLocks noGrp="1"/>
+          </p:cNvSpPr>
+          <p:nvPr>
+            <p:ph type="title"/>
+          </p:nvPr>
+        </p:nvSpPr>
+        <p:spPr>
+          <a:xfrm>
+            <a:off x="603504" y="767419"/>
+            <a:ext cx="10780776" cy="3355848"/>
+          </a:xfrm>
+        </p:spPr>
+        <p:txBody>
+          <a:bodyPr/>
+          <a:lstStyle/>
+          <a:p>
+            <a:pPr marL="0" lvl="0" indent="0">
+              <a:buNone/>
+            </a:pPr>
+            <a:r>
+              <a:t>Feature Importance</a:t>
+            </a:r>
+          </a:p>
+        </p:txBody>
+      </p:sp>
+      <p:sp>
+        <p:nvSpPr>
+          <p:cNvPr id="3" name="Date Placeholder 2">
+            <a:extLst>
+              <a:ext uri="{FF2B5EF4-FFF2-40B4-BE49-F238E27FC236}">
+                <a16:creationId xmlns:a16="http://schemas.microsoft.com/office/drawing/2014/main" id="{E206A9F2-04CE-6A55-AE96-5F204F4A9C26}"/>
+              </a:ext>
+            </a:extLst>
+          </p:cNvPr>
+          <p:cNvSpPr>
+            <a:spLocks noGrp="1"/>
+          </p:cNvSpPr>
+          <p:nvPr>
+            <p:ph type="dt" sz="half" idx="10"/>
+          </p:nvPr>
+        </p:nvSpPr>
+        <p:spPr/>
+        <p:txBody>
+          <a:bodyPr/>
+          <a:lstStyle/>
+          <a:p>
+            <a:r>
+              <a:rPr lang="en-CA"/>
+              <a:t>February 2024</a:t>
+            </a:r>
+          </a:p>
+        </p:txBody>
+      </p:sp>
+      <p:sp>
+        <p:nvSpPr>
+          <p:cNvPr id="4" name="Footer Placeholder 3">
+            <a:extLst>
+              <a:ext uri="{FF2B5EF4-FFF2-40B4-BE49-F238E27FC236}">
+                <a16:creationId xmlns:a16="http://schemas.microsoft.com/office/drawing/2014/main" id="{BBAF330B-ED40-A04D-72D8-39C84FD8E176}"/>
+              </a:ext>
+            </a:extLst>
+          </p:cNvPr>
+          <p:cNvSpPr>
+            <a:spLocks noGrp="1"/>
+          </p:cNvSpPr>
+          <p:nvPr>
+            <p:ph type="ftr" sz="quarter" idx="11"/>
+          </p:nvPr>
+        </p:nvSpPr>
+        <p:spPr/>
+        <p:txBody>
+          <a:bodyPr/>
+          <a:lstStyle/>
+          <a:p>
+            <a:r>
+              <a:rPr lang="en-CA"/>
+              <a:t>Production 4 - Feature Engineering</a:t>
+            </a:r>
+          </a:p>
+        </p:txBody>
+      </p:sp>
+      <p:sp>
+        <p:nvSpPr>
+          <p:cNvPr id="5" name="Slide Number Placeholder 4">
+            <a:extLst>
+              <a:ext uri="{FF2B5EF4-FFF2-40B4-BE49-F238E27FC236}">
+                <a16:creationId xmlns:a16="http://schemas.microsoft.com/office/drawing/2014/main" id="{714597E9-0325-26D8-934B-A9F0D679E0C8}"/>
+              </a:ext>
+            </a:extLst>
+          </p:cNvPr>
+          <p:cNvSpPr>
+            <a:spLocks noGrp="1"/>
+          </p:cNvSpPr>
+          <p:nvPr>
+            <p:ph type="sldNum" sz="quarter" idx="12"/>
+          </p:nvPr>
+        </p:nvSpPr>
+        <p:spPr/>
+        <p:txBody>
+          <a:bodyPr/>
+          <a:lstStyle/>
+          <a:p>
+            <a:fld id="{4F4BDF5D-830C-4829-B676-EE421164B1C8}" type="slidenum">
+              <a:rPr lang="en-CA" smtClean="0"/>
+              <a:t>22</a:t>
+            </a:fld>
+            <a:endParaRPr lang="en-CA"/>
+          </a:p>
+        </p:txBody>
+      </p:sp>
+    </p:spTree>
+  </p:cSld>
+  <p:clrMapOvr>
+    <a:masterClrMapping/>
+  </p:clrMapOvr>
+</p:sld>
+</file>
+
+<file path=ppt/slides/slide23.xml><?xml version="1.0" encoding="utf-8"?>
 <p:sld xmlns:a="http://schemas.openxmlformats.org/drawingml/2006/main" xmlns:r="http://schemas.openxmlformats.org/officeDocument/2006/relationships" xmlns:p="http://schemas.openxmlformats.org/presentationml/2006/main">
   <p:cSld>
     <p:spTree>
@@ -6769,7 +6915,7 @@
           <p:cNvPr id="5" name="Date Placeholder 4">
             <a:extLst>
               <a:ext uri="{FF2B5EF4-FFF2-40B4-BE49-F238E27FC236}">
-                <a16:creationId xmlns:a16="http://schemas.microsoft.com/office/drawing/2014/main" id="{3F8286FF-ED55-D44E-0B90-A32D3E68993B}"/>
+                <a16:creationId xmlns:a16="http://schemas.microsoft.com/office/drawing/2014/main" id="{9595BD7B-D10D-E81B-A947-EA8C0ABE90A0}"/>
               </a:ext>
             </a:extLst>
           </p:cNvPr>
@@ -6785,11 +6931,10 @@
           <a:bodyPr/>
           <a:lstStyle/>
           <a:p>
-            <a:fld id="{F9DBE9B4-5B5F-4C9A-9FCB-B0689BF78932}" type="datetime1">
-              <a:rPr lang="en-CA" smtClean="0"/>
-              <a:t>2024-02-09</a:t>
-            </a:fld>
-            <a:endParaRPr lang="en-CA"/>
+            <a:r>
+              <a:rPr lang="en-CA"/>
+              <a:t>February 2024</a:t>
+            </a:r>
           </a:p>
         </p:txBody>
       </p:sp>
@@ -6798,7 +6943,7 @@
           <p:cNvPr id="6" name="Footer Placeholder 5">
             <a:extLst>
               <a:ext uri="{FF2B5EF4-FFF2-40B4-BE49-F238E27FC236}">
-                <a16:creationId xmlns:a16="http://schemas.microsoft.com/office/drawing/2014/main" id="{1E6ACDAE-251D-E2EE-53D8-933E043A4A3E}"/>
+                <a16:creationId xmlns:a16="http://schemas.microsoft.com/office/drawing/2014/main" id="{B1F64200-5E66-F818-6ABD-5AEC72BECB69}"/>
               </a:ext>
             </a:extLst>
           </p:cNvPr>
@@ -6826,7 +6971,7 @@
           <p:cNvPr id="7" name="Slide Number Placeholder 6">
             <a:extLst>
               <a:ext uri="{FF2B5EF4-FFF2-40B4-BE49-F238E27FC236}">
-                <a16:creationId xmlns:a16="http://schemas.microsoft.com/office/drawing/2014/main" id="{EE3B393A-AE31-530F-F1DF-086AAD01CC88}"/>
+                <a16:creationId xmlns:a16="http://schemas.microsoft.com/office/drawing/2014/main" id="{3FB3DBA2-28C9-1B49-7530-35E18F72833B}"/>
               </a:ext>
             </a:extLst>
           </p:cNvPr>
@@ -6844,7 +6989,7 @@
           <a:p>
             <a:fld id="{4F4BDF5D-830C-4829-B676-EE421164B1C8}" type="slidenum">
               <a:rPr lang="en-CA" smtClean="0"/>
-              <a:t>22</a:t>
+              <a:t>23</a:t>
             </a:fld>
             <a:endParaRPr lang="en-CA"/>
           </a:p>
@@ -6858,7 +7003,7 @@
 </p:sld>
 </file>
 
-<file path=ppt/slides/slide23.xml><?xml version="1.0" encoding="utf-8"?>
+<file path=ppt/slides/slide24.xml><?xml version="1.0" encoding="utf-8"?>
 <p:sld xmlns:a="http://schemas.openxmlformats.org/drawingml/2006/main" xmlns:r="http://schemas.openxmlformats.org/officeDocument/2006/relationships" xmlns:p="http://schemas.openxmlformats.org/presentationml/2006/main">
   <p:cSld>
     <p:spTree>
@@ -6970,7 +7115,7 @@
           <p:cNvPr id="5" name="Date Placeholder 4">
             <a:extLst>
               <a:ext uri="{FF2B5EF4-FFF2-40B4-BE49-F238E27FC236}">
-                <a16:creationId xmlns:a16="http://schemas.microsoft.com/office/drawing/2014/main" id="{71468E30-187E-B2AF-9E62-F37AC12B29EF}"/>
+                <a16:creationId xmlns:a16="http://schemas.microsoft.com/office/drawing/2014/main" id="{19519CEC-6E77-0A3E-615C-6D0E9FC5BB82}"/>
               </a:ext>
             </a:extLst>
           </p:cNvPr>
@@ -6986,11 +7131,10 @@
           <a:bodyPr/>
           <a:lstStyle/>
           <a:p>
-            <a:fld id="{6C0C1C6C-68DF-4B49-833D-EC3A033E3B61}" type="datetime1">
-              <a:rPr lang="en-CA" smtClean="0"/>
-              <a:t>2024-02-09</a:t>
-            </a:fld>
-            <a:endParaRPr lang="en-CA"/>
+            <a:r>
+              <a:rPr lang="en-CA"/>
+              <a:t>February 2024</a:t>
+            </a:r>
           </a:p>
         </p:txBody>
       </p:sp>
@@ -6999,7 +7143,7 @@
           <p:cNvPr id="6" name="Footer Placeholder 5">
             <a:extLst>
               <a:ext uri="{FF2B5EF4-FFF2-40B4-BE49-F238E27FC236}">
-                <a16:creationId xmlns:a16="http://schemas.microsoft.com/office/drawing/2014/main" id="{69DE9C27-FDC5-0029-6E96-EBFF3BACD8A7}"/>
+                <a16:creationId xmlns:a16="http://schemas.microsoft.com/office/drawing/2014/main" id="{B12C31EE-AB0D-52FA-1FAF-B2AF9DA44F23}"/>
               </a:ext>
             </a:extLst>
           </p:cNvPr>
@@ -7027,7 +7171,7 @@
           <p:cNvPr id="7" name="Slide Number Placeholder 6">
             <a:extLst>
               <a:ext uri="{FF2B5EF4-FFF2-40B4-BE49-F238E27FC236}">
-                <a16:creationId xmlns:a16="http://schemas.microsoft.com/office/drawing/2014/main" id="{9F980D1C-E343-44BE-8C79-41194767BF0C}"/>
+                <a16:creationId xmlns:a16="http://schemas.microsoft.com/office/drawing/2014/main" id="{E9222A5A-7CF4-0AF6-A9E4-F07495694204}"/>
               </a:ext>
             </a:extLst>
           </p:cNvPr>
@@ -7045,7 +7189,7 @@
           <a:p>
             <a:fld id="{4F4BDF5D-830C-4829-B676-EE421164B1C8}" type="slidenum">
               <a:rPr lang="en-CA" smtClean="0"/>
-              <a:t>23</a:t>
+              <a:t>24</a:t>
             </a:fld>
             <a:endParaRPr lang="en-CA"/>
           </a:p>
@@ -7059,7 +7203,7 @@
 </p:sld>
 </file>
 
-<file path=ppt/slides/slide24.xml><?xml version="1.0" encoding="utf-8"?>
+<file path=ppt/slides/slide25.xml><?xml version="1.0" encoding="utf-8"?>
 <p:sld xmlns:a="http://schemas.openxmlformats.org/drawingml/2006/main" xmlns:r="http://schemas.openxmlformats.org/officeDocument/2006/relationships" xmlns:p="http://schemas.openxmlformats.org/presentationml/2006/main">
   <p:cSld>
     <p:spTree>
@@ -7207,7 +7351,7 @@
           <p:cNvPr id="5" name="Date Placeholder 4">
             <a:extLst>
               <a:ext uri="{FF2B5EF4-FFF2-40B4-BE49-F238E27FC236}">
-                <a16:creationId xmlns:a16="http://schemas.microsoft.com/office/drawing/2014/main" id="{210A752C-7D4E-CC1E-9711-B5B11EB089BC}"/>
+                <a16:creationId xmlns:a16="http://schemas.microsoft.com/office/drawing/2014/main" id="{9C501CD2-7241-315E-DA70-0E33A04924AF}"/>
               </a:ext>
             </a:extLst>
           </p:cNvPr>
@@ -7223,11 +7367,10 @@
           <a:bodyPr/>
           <a:lstStyle/>
           <a:p>
-            <a:fld id="{83D18FE3-10EF-4545-98C5-4C1A4A1D370B}" type="datetime1">
-              <a:rPr lang="en-CA" smtClean="0"/>
-              <a:t>2024-02-09</a:t>
-            </a:fld>
-            <a:endParaRPr lang="en-CA"/>
+            <a:r>
+              <a:rPr lang="en-CA"/>
+              <a:t>February 2024</a:t>
+            </a:r>
           </a:p>
         </p:txBody>
       </p:sp>
@@ -7236,7 +7379,7 @@
           <p:cNvPr id="6" name="Footer Placeholder 5">
             <a:extLst>
               <a:ext uri="{FF2B5EF4-FFF2-40B4-BE49-F238E27FC236}">
-                <a16:creationId xmlns:a16="http://schemas.microsoft.com/office/drawing/2014/main" id="{EE6948CB-F769-5929-2189-25AE3F7CA7A5}"/>
+                <a16:creationId xmlns:a16="http://schemas.microsoft.com/office/drawing/2014/main" id="{7800C173-502B-BB26-38D4-7136279D223F}"/>
               </a:ext>
             </a:extLst>
           </p:cNvPr>
@@ -7264,7 +7407,7 @@
           <p:cNvPr id="7" name="Slide Number Placeholder 6">
             <a:extLst>
               <a:ext uri="{FF2B5EF4-FFF2-40B4-BE49-F238E27FC236}">
-                <a16:creationId xmlns:a16="http://schemas.microsoft.com/office/drawing/2014/main" id="{6AA6AAFA-27E1-23F4-169D-51AEA07981F8}"/>
+                <a16:creationId xmlns:a16="http://schemas.microsoft.com/office/drawing/2014/main" id="{1DFCDD0D-C0DA-15C5-762A-7BC3C4ABAF4F}"/>
               </a:ext>
             </a:extLst>
           </p:cNvPr>
@@ -7282,7 +7425,7 @@
           <a:p>
             <a:fld id="{4F4BDF5D-830C-4829-B676-EE421164B1C8}" type="slidenum">
               <a:rPr lang="en-CA" smtClean="0"/>
-              <a:t>24</a:t>
+              <a:t>25</a:t>
             </a:fld>
             <a:endParaRPr lang="en-CA"/>
           </a:p>
@@ -7296,7 +7439,7 @@
 </p:sld>
 </file>
 
-<file path=ppt/slides/slide25.xml><?xml version="1.0" encoding="utf-8"?>
+<file path=ppt/slides/slide26.xml><?xml version="1.0" encoding="utf-8"?>
 <p:sld xmlns:a="http://schemas.openxmlformats.org/drawingml/2006/main" xmlns:r="http://schemas.openxmlformats.org/officeDocument/2006/relationships" xmlns:p="http://schemas.openxmlformats.org/presentationml/2006/main">
   <p:cSld>
     <p:spTree>
@@ -7437,7 +7580,7 @@
           <p:cNvPr id="6" name="Date Placeholder 5">
             <a:extLst>
               <a:ext uri="{FF2B5EF4-FFF2-40B4-BE49-F238E27FC236}">
-                <a16:creationId xmlns:a16="http://schemas.microsoft.com/office/drawing/2014/main" id="{CADB95FB-743A-40FE-52E7-0F5AB85888B0}"/>
+                <a16:creationId xmlns:a16="http://schemas.microsoft.com/office/drawing/2014/main" id="{1D9FB411-8124-696D-1183-4895D4D47E5C}"/>
               </a:ext>
             </a:extLst>
           </p:cNvPr>
@@ -7453,11 +7596,10 @@
           <a:bodyPr/>
           <a:lstStyle/>
           <a:p>
-            <a:fld id="{C4060211-B99D-42E8-A10E-2C8D53FF7EE3}" type="datetime1">
-              <a:rPr lang="en-CA" smtClean="0"/>
-              <a:t>2024-02-09</a:t>
-            </a:fld>
-            <a:endParaRPr lang="en-CA"/>
+            <a:r>
+              <a:rPr lang="en-CA"/>
+              <a:t>February 2024</a:t>
+            </a:r>
           </a:p>
         </p:txBody>
       </p:sp>
@@ -7466,7 +7608,7 @@
           <p:cNvPr id="7" name="Footer Placeholder 6">
             <a:extLst>
               <a:ext uri="{FF2B5EF4-FFF2-40B4-BE49-F238E27FC236}">
-                <a16:creationId xmlns:a16="http://schemas.microsoft.com/office/drawing/2014/main" id="{146C89DD-AB62-B6A9-5EEA-DF37AD950843}"/>
+                <a16:creationId xmlns:a16="http://schemas.microsoft.com/office/drawing/2014/main" id="{9F3A0397-1761-EBA7-51C8-498C78A5A4F5}"/>
               </a:ext>
             </a:extLst>
           </p:cNvPr>
@@ -7494,7 +7636,7 @@
           <p:cNvPr id="8" name="Slide Number Placeholder 7">
             <a:extLst>
               <a:ext uri="{FF2B5EF4-FFF2-40B4-BE49-F238E27FC236}">
-                <a16:creationId xmlns:a16="http://schemas.microsoft.com/office/drawing/2014/main" id="{6904DFE0-5349-4BAA-C362-2CDF170FF728}"/>
+                <a16:creationId xmlns:a16="http://schemas.microsoft.com/office/drawing/2014/main" id="{684B55B4-7599-3E37-BAB8-532C36D29FC2}"/>
               </a:ext>
             </a:extLst>
           </p:cNvPr>
@@ -7512,7 +7654,7 @@
           <a:p>
             <a:fld id="{4F4BDF5D-830C-4829-B676-EE421164B1C8}" type="slidenum">
               <a:rPr lang="en-CA" smtClean="0"/>
-              <a:t>25</a:t>
+              <a:t>26</a:t>
             </a:fld>
             <a:endParaRPr lang="en-CA"/>
           </a:p>
@@ -7526,7 +7668,7 @@
 </p:sld>
 </file>
 
-<file path=ppt/slides/slide26.xml><?xml version="1.0" encoding="utf-8"?>
+<file path=ppt/slides/slide27.xml><?xml version="1.0" encoding="utf-8"?>
 <p:sld xmlns:a="http://schemas.openxmlformats.org/drawingml/2006/main" xmlns:r="http://schemas.openxmlformats.org/officeDocument/2006/relationships" xmlns:p="http://schemas.openxmlformats.org/presentationml/2006/main">
   <p:cSld>
     <p:spTree>
@@ -7685,7 +7827,7 @@
           <p:cNvPr id="6" name="Date Placeholder 5">
             <a:extLst>
               <a:ext uri="{FF2B5EF4-FFF2-40B4-BE49-F238E27FC236}">
-                <a16:creationId xmlns:a16="http://schemas.microsoft.com/office/drawing/2014/main" id="{631235E8-07CF-81E6-0780-F4C4FF00F105}"/>
+                <a16:creationId xmlns:a16="http://schemas.microsoft.com/office/drawing/2014/main" id="{ABAC218D-B7AE-D18E-1139-31951DAD9584}"/>
               </a:ext>
             </a:extLst>
           </p:cNvPr>
@@ -7701,11 +7843,10 @@
           <a:bodyPr/>
           <a:lstStyle/>
           <a:p>
-            <a:fld id="{682926E2-7DBB-404E-9E27-C8E0E43DB132}" type="datetime1">
-              <a:rPr lang="en-CA" smtClean="0"/>
-              <a:t>2024-02-09</a:t>
-            </a:fld>
-            <a:endParaRPr lang="en-CA"/>
+            <a:r>
+              <a:rPr lang="en-CA"/>
+              <a:t>February 2024</a:t>
+            </a:r>
           </a:p>
         </p:txBody>
       </p:sp>
@@ -7714,7 +7855,7 @@
           <p:cNvPr id="7" name="Footer Placeholder 6">
             <a:extLst>
               <a:ext uri="{FF2B5EF4-FFF2-40B4-BE49-F238E27FC236}">
-                <a16:creationId xmlns:a16="http://schemas.microsoft.com/office/drawing/2014/main" id="{68BC2B64-A9B1-5997-73BC-5D6F4275D958}"/>
+                <a16:creationId xmlns:a16="http://schemas.microsoft.com/office/drawing/2014/main" id="{9B3DC112-51BD-CD00-B11E-D281FE5F8C03}"/>
               </a:ext>
             </a:extLst>
           </p:cNvPr>
@@ -7742,7 +7883,7 @@
           <p:cNvPr id="8" name="Slide Number Placeholder 7">
             <a:extLst>
               <a:ext uri="{FF2B5EF4-FFF2-40B4-BE49-F238E27FC236}">
-                <a16:creationId xmlns:a16="http://schemas.microsoft.com/office/drawing/2014/main" id="{8F3A58EA-BBD3-21EF-855F-B24CF5CF8891}"/>
+                <a16:creationId xmlns:a16="http://schemas.microsoft.com/office/drawing/2014/main" id="{07F4089A-E52E-5945-570D-3048048CC212}"/>
               </a:ext>
             </a:extLst>
           </p:cNvPr>
@@ -7760,7 +7901,7 @@
           <a:p>
             <a:fld id="{4F4BDF5D-830C-4829-B676-EE421164B1C8}" type="slidenum">
               <a:rPr lang="en-CA" smtClean="0"/>
-              <a:t>26</a:t>
+              <a:t>27</a:t>
             </a:fld>
             <a:endParaRPr lang="en-CA"/>
           </a:p>
@@ -7774,7 +7915,7 @@
 </p:sld>
 </file>
 
-<file path=ppt/slides/slide27.xml><?xml version="1.0" encoding="utf-8"?>
+<file path=ppt/slides/slide28.xml><?xml version="1.0" encoding="utf-8"?>
 <p:sld xmlns:a="http://schemas.openxmlformats.org/drawingml/2006/main" xmlns:r="http://schemas.openxmlformats.org/officeDocument/2006/relationships" xmlns:p="http://schemas.openxmlformats.org/presentationml/2006/main">
   <p:cSld>
     <p:spTree>
@@ -7934,7 +8075,7 @@
           <p:cNvPr id="5" name="Date Placeholder 4">
             <a:extLst>
               <a:ext uri="{FF2B5EF4-FFF2-40B4-BE49-F238E27FC236}">
-                <a16:creationId xmlns:a16="http://schemas.microsoft.com/office/drawing/2014/main" id="{EFE9BEBB-8E78-90BC-17C8-85328E8ADFAB}"/>
+                <a16:creationId xmlns:a16="http://schemas.microsoft.com/office/drawing/2014/main" id="{EE36675D-DD26-FC5F-38D2-D064EBE15B71}"/>
               </a:ext>
             </a:extLst>
           </p:cNvPr>
@@ -7950,11 +8091,10 @@
           <a:bodyPr/>
           <a:lstStyle/>
           <a:p>
-            <a:fld id="{97BF888C-96FB-4DC1-ABFF-6EA0FD75959D}" type="datetime1">
-              <a:rPr lang="en-CA" smtClean="0"/>
-              <a:t>2024-02-09</a:t>
-            </a:fld>
-            <a:endParaRPr lang="en-CA"/>
+            <a:r>
+              <a:rPr lang="en-CA"/>
+              <a:t>February 2024</a:t>
+            </a:r>
           </a:p>
         </p:txBody>
       </p:sp>
@@ -7963,7 +8103,7 @@
           <p:cNvPr id="6" name="Footer Placeholder 5">
             <a:extLst>
               <a:ext uri="{FF2B5EF4-FFF2-40B4-BE49-F238E27FC236}">
-                <a16:creationId xmlns:a16="http://schemas.microsoft.com/office/drawing/2014/main" id="{375AD23A-4CF3-C3E5-18EF-183AEB87B8AE}"/>
+                <a16:creationId xmlns:a16="http://schemas.microsoft.com/office/drawing/2014/main" id="{974B4C34-A399-D38F-2CD5-FC9E18FB04D4}"/>
               </a:ext>
             </a:extLst>
           </p:cNvPr>
@@ -7991,7 +8131,7 @@
           <p:cNvPr id="7" name="Slide Number Placeholder 6">
             <a:extLst>
               <a:ext uri="{FF2B5EF4-FFF2-40B4-BE49-F238E27FC236}">
-                <a16:creationId xmlns:a16="http://schemas.microsoft.com/office/drawing/2014/main" id="{A134B811-FFB7-EFFD-2AA8-0063C1E25583}"/>
+                <a16:creationId xmlns:a16="http://schemas.microsoft.com/office/drawing/2014/main" id="{CA370C22-1BAA-3F92-2534-A616C0AFDBD9}"/>
               </a:ext>
             </a:extLst>
           </p:cNvPr>
@@ -8009,7 +8149,7 @@
           <a:p>
             <a:fld id="{4F4BDF5D-830C-4829-B676-EE421164B1C8}" type="slidenum">
               <a:rPr lang="en-CA" smtClean="0"/>
-              <a:t>27</a:t>
+              <a:t>28</a:t>
             </a:fld>
             <a:endParaRPr lang="en-CA"/>
           </a:p>
@@ -8150,7 +8290,7 @@
           <p:cNvPr id="5" name="Date Placeholder 4">
             <a:extLst>
               <a:ext uri="{FF2B5EF4-FFF2-40B4-BE49-F238E27FC236}">
-                <a16:creationId xmlns:a16="http://schemas.microsoft.com/office/drawing/2014/main" id="{40DC85C3-2C93-7747-AB77-9237845F34C0}"/>
+                <a16:creationId xmlns:a16="http://schemas.microsoft.com/office/drawing/2014/main" id="{1FB4DEFC-DDFC-704B-DB62-997C1D13EAFA}"/>
               </a:ext>
             </a:extLst>
           </p:cNvPr>
@@ -8166,11 +8306,10 @@
           <a:bodyPr/>
           <a:lstStyle/>
           <a:p>
-            <a:fld id="{CD8B7500-440B-44BF-B76F-C0DEDF700CCB}" type="datetime1">
-              <a:rPr lang="en-CA" smtClean="0"/>
-              <a:t>2024-02-09</a:t>
-            </a:fld>
-            <a:endParaRPr lang="en-CA"/>
+            <a:r>
+              <a:rPr lang="en-CA"/>
+              <a:t>February 2024</a:t>
+            </a:r>
           </a:p>
         </p:txBody>
       </p:sp>
@@ -8179,7 +8318,7 @@
           <p:cNvPr id="6" name="Footer Placeholder 5">
             <a:extLst>
               <a:ext uri="{FF2B5EF4-FFF2-40B4-BE49-F238E27FC236}">
-                <a16:creationId xmlns:a16="http://schemas.microsoft.com/office/drawing/2014/main" id="{830DEBEA-0B06-2DFA-B62C-686F204CD5CF}"/>
+                <a16:creationId xmlns:a16="http://schemas.microsoft.com/office/drawing/2014/main" id="{1C476D5F-839A-6537-66E4-BAED0E47A9D2}"/>
               </a:ext>
             </a:extLst>
           </p:cNvPr>
@@ -8207,7 +8346,7 @@
           <p:cNvPr id="7" name="Slide Number Placeholder 6">
             <a:extLst>
               <a:ext uri="{FF2B5EF4-FFF2-40B4-BE49-F238E27FC236}">
-                <a16:creationId xmlns:a16="http://schemas.microsoft.com/office/drawing/2014/main" id="{5990D371-48E7-6D83-9806-3FADB644AEDE}"/>
+                <a16:creationId xmlns:a16="http://schemas.microsoft.com/office/drawing/2014/main" id="{1DD04B4F-1DC0-986D-F83B-B136E233F903}"/>
               </a:ext>
             </a:extLst>
           </p:cNvPr>
@@ -8341,7 +8480,7 @@
           <p:cNvPr id="5" name="Date Placeholder 4">
             <a:extLst>
               <a:ext uri="{FF2B5EF4-FFF2-40B4-BE49-F238E27FC236}">
-                <a16:creationId xmlns:a16="http://schemas.microsoft.com/office/drawing/2014/main" id="{5D9C086D-750A-C5E9-4453-2292F78AC371}"/>
+                <a16:creationId xmlns:a16="http://schemas.microsoft.com/office/drawing/2014/main" id="{A79AEBDD-B250-DC32-B49A-965F931D832D}"/>
               </a:ext>
             </a:extLst>
           </p:cNvPr>
@@ -8357,11 +8496,10 @@
           <a:bodyPr/>
           <a:lstStyle/>
           <a:p>
-            <a:fld id="{C6DEA295-CA80-458E-8EF9-F68EA5EDE5B9}" type="datetime1">
-              <a:rPr lang="en-CA" smtClean="0"/>
-              <a:t>2024-02-09</a:t>
-            </a:fld>
-            <a:endParaRPr lang="en-CA"/>
+            <a:r>
+              <a:rPr lang="en-CA"/>
+              <a:t>February 2024</a:t>
+            </a:r>
           </a:p>
         </p:txBody>
       </p:sp>
@@ -8370,7 +8508,7 @@
           <p:cNvPr id="6" name="Footer Placeholder 5">
             <a:extLst>
               <a:ext uri="{FF2B5EF4-FFF2-40B4-BE49-F238E27FC236}">
-                <a16:creationId xmlns:a16="http://schemas.microsoft.com/office/drawing/2014/main" id="{739CBB87-AE28-9457-9CFF-086E51AD8DE3}"/>
+                <a16:creationId xmlns:a16="http://schemas.microsoft.com/office/drawing/2014/main" id="{AD205543-06E4-1BF7-1EA8-0D9F3AF4C575}"/>
               </a:ext>
             </a:extLst>
           </p:cNvPr>
@@ -8398,7 +8536,7 @@
           <p:cNvPr id="7" name="Slide Number Placeholder 6">
             <a:extLst>
               <a:ext uri="{FF2B5EF4-FFF2-40B4-BE49-F238E27FC236}">
-                <a16:creationId xmlns:a16="http://schemas.microsoft.com/office/drawing/2014/main" id="{F4754720-DFCA-E5F4-1A7A-59710BEF013F}"/>
+                <a16:creationId xmlns:a16="http://schemas.microsoft.com/office/drawing/2014/main" id="{CD4E0553-7E55-F782-E6EE-DE6DF3F40EF5}"/>
               </a:ext>
             </a:extLst>
           </p:cNvPr>
@@ -8563,7 +8701,7 @@
           <p:cNvPr id="5" name="Date Placeholder 4">
             <a:extLst>
               <a:ext uri="{FF2B5EF4-FFF2-40B4-BE49-F238E27FC236}">
-                <a16:creationId xmlns:a16="http://schemas.microsoft.com/office/drawing/2014/main" id="{2B2C1025-7970-3333-4C9B-8B302E9712E3}"/>
+                <a16:creationId xmlns:a16="http://schemas.microsoft.com/office/drawing/2014/main" id="{A37A2219-CDB8-F94A-1800-98526E30FB0C}"/>
               </a:ext>
             </a:extLst>
           </p:cNvPr>
@@ -8579,11 +8717,10 @@
           <a:bodyPr/>
           <a:lstStyle/>
           <a:p>
-            <a:fld id="{38EEB33C-BB1C-438A-A263-10DA764CB7D8}" type="datetime1">
-              <a:rPr lang="en-CA" smtClean="0"/>
-              <a:t>2024-02-09</a:t>
-            </a:fld>
-            <a:endParaRPr lang="en-CA"/>
+            <a:r>
+              <a:rPr lang="en-CA"/>
+              <a:t>February 2024</a:t>
+            </a:r>
           </a:p>
         </p:txBody>
       </p:sp>
@@ -8592,7 +8729,7 @@
           <p:cNvPr id="6" name="Footer Placeholder 5">
             <a:extLst>
               <a:ext uri="{FF2B5EF4-FFF2-40B4-BE49-F238E27FC236}">
-                <a16:creationId xmlns:a16="http://schemas.microsoft.com/office/drawing/2014/main" id="{EF242BBE-83B4-02C5-679D-DEA8522B8655}"/>
+                <a16:creationId xmlns:a16="http://schemas.microsoft.com/office/drawing/2014/main" id="{DCB4EAF4-4C34-57B2-3933-4088A170D898}"/>
               </a:ext>
             </a:extLst>
           </p:cNvPr>
@@ -8620,7 +8757,7 @@
           <p:cNvPr id="7" name="Slide Number Placeholder 6">
             <a:extLst>
               <a:ext uri="{FF2B5EF4-FFF2-40B4-BE49-F238E27FC236}">
-                <a16:creationId xmlns:a16="http://schemas.microsoft.com/office/drawing/2014/main" id="{8A42C2DB-1981-DC20-3C3D-8086C605CF28}"/>
+                <a16:creationId xmlns:a16="http://schemas.microsoft.com/office/drawing/2014/main" id="{84428E73-89EC-1A73-2924-C8D58F998A68}"/>
               </a:ext>
             </a:extLst>
           </p:cNvPr>
@@ -8703,7 +8840,7 @@
           <p:cNvPr id="3" name="Date Placeholder 2">
             <a:extLst>
               <a:ext uri="{FF2B5EF4-FFF2-40B4-BE49-F238E27FC236}">
-                <a16:creationId xmlns:a16="http://schemas.microsoft.com/office/drawing/2014/main" id="{D64CC382-386E-8308-9D6A-E8ACEFE9023E}"/>
+                <a16:creationId xmlns:a16="http://schemas.microsoft.com/office/drawing/2014/main" id="{9D5632F7-4CE9-B6BC-E1FE-CCFCEFD59972}"/>
               </a:ext>
             </a:extLst>
           </p:cNvPr>
@@ -8719,11 +8856,10 @@
           <a:bodyPr/>
           <a:lstStyle/>
           <a:p>
-            <a:fld id="{FE06258A-ECC3-4E93-9C20-FE274CC0B6E1}" type="datetime1">
-              <a:rPr lang="en-CA" smtClean="0"/>
-              <a:t>2024-02-09</a:t>
-            </a:fld>
-            <a:endParaRPr lang="en-CA"/>
+            <a:r>
+              <a:rPr lang="en-CA"/>
+              <a:t>February 2024</a:t>
+            </a:r>
           </a:p>
         </p:txBody>
       </p:sp>
@@ -8732,7 +8868,7 @@
           <p:cNvPr id="4" name="Footer Placeholder 3">
             <a:extLst>
               <a:ext uri="{FF2B5EF4-FFF2-40B4-BE49-F238E27FC236}">
-                <a16:creationId xmlns:a16="http://schemas.microsoft.com/office/drawing/2014/main" id="{6B5515C5-3E59-62E3-1846-C85D5C34FA0C}"/>
+                <a16:creationId xmlns:a16="http://schemas.microsoft.com/office/drawing/2014/main" id="{CCD58AEA-C045-A8C7-A145-3092F02063BB}"/>
               </a:ext>
             </a:extLst>
           </p:cNvPr>
@@ -8760,7 +8896,7 @@
           <p:cNvPr id="5" name="Slide Number Placeholder 4">
             <a:extLst>
               <a:ext uri="{FF2B5EF4-FFF2-40B4-BE49-F238E27FC236}">
-                <a16:creationId xmlns:a16="http://schemas.microsoft.com/office/drawing/2014/main" id="{829C3261-27BA-E485-C9F1-5E6C3C942347}"/>
+                <a16:creationId xmlns:a16="http://schemas.microsoft.com/office/drawing/2014/main" id="{B3C8B74B-6539-6CE0-8014-06EC1936FF19}"/>
               </a:ext>
             </a:extLst>
           </p:cNvPr>
@@ -8975,7 +9111,7 @@
           <p:cNvPr id="5" name="Date Placeholder 4">
             <a:extLst>
               <a:ext uri="{FF2B5EF4-FFF2-40B4-BE49-F238E27FC236}">
-                <a16:creationId xmlns:a16="http://schemas.microsoft.com/office/drawing/2014/main" id="{A9215B39-8A68-128E-FB48-04448F38D361}"/>
+                <a16:creationId xmlns:a16="http://schemas.microsoft.com/office/drawing/2014/main" id="{ECE8FF67-E6FA-033C-D909-73F8B1DE81DB}"/>
               </a:ext>
             </a:extLst>
           </p:cNvPr>
@@ -8991,11 +9127,10 @@
           <a:bodyPr/>
           <a:lstStyle/>
           <a:p>
-            <a:fld id="{E80534E6-EA6C-4D9A-8C9F-8FE829815BCF}" type="datetime1">
-              <a:rPr lang="en-CA" smtClean="0"/>
-              <a:t>2024-02-09</a:t>
-            </a:fld>
-            <a:endParaRPr lang="en-CA"/>
+            <a:r>
+              <a:rPr lang="en-CA"/>
+              <a:t>February 2024</a:t>
+            </a:r>
           </a:p>
         </p:txBody>
       </p:sp>
@@ -9004,7 +9139,7 @@
           <p:cNvPr id="6" name="Footer Placeholder 5">
             <a:extLst>
               <a:ext uri="{FF2B5EF4-FFF2-40B4-BE49-F238E27FC236}">
-                <a16:creationId xmlns:a16="http://schemas.microsoft.com/office/drawing/2014/main" id="{3732180F-2EC8-65F4-146E-13A28780D28E}"/>
+                <a16:creationId xmlns:a16="http://schemas.microsoft.com/office/drawing/2014/main" id="{E83CE17C-2175-C708-B28C-DA4F55158C07}"/>
               </a:ext>
             </a:extLst>
           </p:cNvPr>
@@ -9032,7 +9167,7 @@
           <p:cNvPr id="7" name="Slide Number Placeholder 6">
             <a:extLst>
               <a:ext uri="{FF2B5EF4-FFF2-40B4-BE49-F238E27FC236}">
-                <a16:creationId xmlns:a16="http://schemas.microsoft.com/office/drawing/2014/main" id="{C3B575F0-D9B2-9D87-1A8E-170D051FE369}"/>
+                <a16:creationId xmlns:a16="http://schemas.microsoft.com/office/drawing/2014/main" id="{EFB08957-E173-8885-4333-9F3A9736F367}"/>
               </a:ext>
             </a:extLst>
           </p:cNvPr>
@@ -9182,7 +9317,7 @@
           <p:cNvPr id="5" name="Date Placeholder 4">
             <a:extLst>
               <a:ext uri="{FF2B5EF4-FFF2-40B4-BE49-F238E27FC236}">
-                <a16:creationId xmlns:a16="http://schemas.microsoft.com/office/drawing/2014/main" id="{2EE155F3-0BD8-81CC-8BCE-889D44EE8CA3}"/>
+                <a16:creationId xmlns:a16="http://schemas.microsoft.com/office/drawing/2014/main" id="{17BE2774-9E5A-B375-8623-EA5FE3AEA180}"/>
               </a:ext>
             </a:extLst>
           </p:cNvPr>
@@ -9198,11 +9333,10 @@
           <a:bodyPr/>
           <a:lstStyle/>
           <a:p>
-            <a:fld id="{AC05D40B-E389-4B48-A582-E99AD4256CB6}" type="datetime1">
-              <a:rPr lang="en-CA" smtClean="0"/>
-              <a:t>2024-02-09</a:t>
-            </a:fld>
-            <a:endParaRPr lang="en-CA"/>
+            <a:r>
+              <a:rPr lang="en-CA"/>
+              <a:t>February 2024</a:t>
+            </a:r>
           </a:p>
         </p:txBody>
       </p:sp>
@@ -9211,7 +9345,7 @@
           <p:cNvPr id="6" name="Footer Placeholder 5">
             <a:extLst>
               <a:ext uri="{FF2B5EF4-FFF2-40B4-BE49-F238E27FC236}">
-                <a16:creationId xmlns:a16="http://schemas.microsoft.com/office/drawing/2014/main" id="{129BC81F-BED5-62A5-2312-695DC9CB6561}"/>
+                <a16:creationId xmlns:a16="http://schemas.microsoft.com/office/drawing/2014/main" id="{84EE64C3-8A04-BB9B-FE63-8F0D112C4C94}"/>
               </a:ext>
             </a:extLst>
           </p:cNvPr>
@@ -9239,7 +9373,7 @@
           <p:cNvPr id="7" name="Slide Number Placeholder 6">
             <a:extLst>
               <a:ext uri="{FF2B5EF4-FFF2-40B4-BE49-F238E27FC236}">
-                <a16:creationId xmlns:a16="http://schemas.microsoft.com/office/drawing/2014/main" id="{3880AF14-B87A-CEE4-A5A8-B796ADBF308F}"/>
+                <a16:creationId xmlns:a16="http://schemas.microsoft.com/office/drawing/2014/main" id="{DAE8818A-7D03-85EB-0578-4D9E2BA43544}"/>
               </a:ext>
             </a:extLst>
           </p:cNvPr>
@@ -9828,7 +9962,7 @@
           <p:cNvPr id="4" name="Date Placeholder 3">
             <a:extLst>
               <a:ext uri="{FF2B5EF4-FFF2-40B4-BE49-F238E27FC236}">
-                <a16:creationId xmlns:a16="http://schemas.microsoft.com/office/drawing/2014/main" id="{0BFB9B49-ACC9-40C0-BDE4-6E2D6D48B5B7}"/>
+                <a16:creationId xmlns:a16="http://schemas.microsoft.com/office/drawing/2014/main" id="{0482C3AC-ED7C-5A6C-3864-4AE44958799A}"/>
               </a:ext>
             </a:extLst>
           </p:cNvPr>
@@ -9844,11 +9978,10 @@
           <a:bodyPr/>
           <a:lstStyle/>
           <a:p>
-            <a:fld id="{B1693DC4-5B3C-4DD8-8701-C44D58AD7AEE}" type="datetime1">
-              <a:rPr lang="en-CA" smtClean="0"/>
-              <a:t>2024-02-09</a:t>
-            </a:fld>
-            <a:endParaRPr lang="en-CA"/>
+            <a:r>
+              <a:rPr lang="en-CA"/>
+              <a:t>February 2024</a:t>
+            </a:r>
           </a:p>
         </p:txBody>
       </p:sp>
@@ -9857,7 +9990,7 @@
           <p:cNvPr id="5" name="Footer Placeholder 4">
             <a:extLst>
               <a:ext uri="{FF2B5EF4-FFF2-40B4-BE49-F238E27FC236}">
-                <a16:creationId xmlns:a16="http://schemas.microsoft.com/office/drawing/2014/main" id="{604AA12C-3451-4BF6-A0DA-E8DF23CC0F43}"/>
+                <a16:creationId xmlns:a16="http://schemas.microsoft.com/office/drawing/2014/main" id="{E275D632-8C1E-A645-DBF9-1D7E5914508C}"/>
               </a:ext>
             </a:extLst>
           </p:cNvPr>
@@ -9885,7 +10018,7 @@
           <p:cNvPr id="6" name="Slide Number Placeholder 5">
             <a:extLst>
               <a:ext uri="{FF2B5EF4-FFF2-40B4-BE49-F238E27FC236}">
-                <a16:creationId xmlns:a16="http://schemas.microsoft.com/office/drawing/2014/main" id="{9C511639-0FE7-832B-2E98-54BC82933DAB}"/>
+                <a16:creationId xmlns:a16="http://schemas.microsoft.com/office/drawing/2014/main" id="{187A01F7-49FE-76E8-370E-30FE6C0A3D7C}"/>
               </a:ext>
             </a:extLst>
           </p:cNvPr>

</xml_diff>